<commit_message>
Images go through memory only yay
</commit_message>
<xml_diff>
--- a/newDeck.pptx
+++ b/newDeck.pptx
@@ -4112,7 +4112,7 @@
           <a:p>
             <a:r>
               <a:rPr lang="en-US" dirty="0"/>
-              <a:t>*0*</a:t>
+              <a:t>5560 - State 1 - VT-07 On-Board Emissions</a:t>
             </a:r>
           </a:p>
         </p:txBody>
@@ -4154,6 +4154,174 @@
           </a:p>
         </p:txBody>
       </p:sp>
+      <p:pic>
+        <p:nvPicPr>
+          <p:cNvPr id="5" name="Picture 4" descr="image.png"/>
+          <p:cNvPicPr>
+            <a:picLocks noChangeAspect="1"/>
+          </p:cNvPicPr>
+          <p:nvPr/>
+        </p:nvPicPr>
+        <p:blipFill>
+          <a:blip r:embed="rId2"/>
+          <a:stretch>
+            <a:fillRect/>
+          </a:stretch>
+        </p:blipFill>
+        <p:spPr>
+          <a:xfrm>
+            <a:off x="12700" y="889000"/>
+            <a:ext cx="2959100" cy="2235200"/>
+          </a:xfrm>
+          <a:prstGeom prst="rect">
+            <a:avLst/>
+          </a:prstGeom>
+        </p:spPr>
+      </p:pic>
+      <p:pic>
+        <p:nvPicPr>
+          <p:cNvPr id="6" name="Picture 5" descr="image.png"/>
+          <p:cNvPicPr>
+            <a:picLocks noChangeAspect="1"/>
+          </p:cNvPicPr>
+          <p:nvPr/>
+        </p:nvPicPr>
+        <p:blipFill>
+          <a:blip r:embed="rId3"/>
+          <a:stretch>
+            <a:fillRect/>
+          </a:stretch>
+        </p:blipFill>
+        <p:spPr>
+          <a:xfrm>
+            <a:off x="3035300" y="889000"/>
+            <a:ext cx="2959100" cy="2235200"/>
+          </a:xfrm>
+          <a:prstGeom prst="rect">
+            <a:avLst/>
+          </a:prstGeom>
+        </p:spPr>
+      </p:pic>
+      <p:pic>
+        <p:nvPicPr>
+          <p:cNvPr id="7" name="Picture 6" descr="image.png"/>
+          <p:cNvPicPr>
+            <a:picLocks noChangeAspect="1"/>
+          </p:cNvPicPr>
+          <p:nvPr/>
+        </p:nvPicPr>
+        <p:blipFill>
+          <a:blip r:embed="rId4"/>
+          <a:stretch>
+            <a:fillRect/>
+          </a:stretch>
+        </p:blipFill>
+        <p:spPr>
+          <a:xfrm>
+            <a:off x="6057900" y="889000"/>
+            <a:ext cx="2959100" cy="2235200"/>
+          </a:xfrm>
+          <a:prstGeom prst="rect">
+            <a:avLst/>
+          </a:prstGeom>
+        </p:spPr>
+      </p:pic>
+      <p:pic>
+        <p:nvPicPr>
+          <p:cNvPr id="8" name="Picture 7" descr="image.png"/>
+          <p:cNvPicPr>
+            <a:picLocks noChangeAspect="1"/>
+          </p:cNvPicPr>
+          <p:nvPr/>
+        </p:nvPicPr>
+        <p:blipFill>
+          <a:blip r:embed="rId5"/>
+          <a:stretch>
+            <a:fillRect/>
+          </a:stretch>
+        </p:blipFill>
+        <p:spPr>
+          <a:xfrm>
+            <a:off x="12700" y="3492500"/>
+            <a:ext cx="2222500" cy="1651000"/>
+          </a:xfrm>
+          <a:prstGeom prst="rect">
+            <a:avLst/>
+          </a:prstGeom>
+        </p:spPr>
+      </p:pic>
+      <p:pic>
+        <p:nvPicPr>
+          <p:cNvPr id="9" name="Picture 8" descr="image.png"/>
+          <p:cNvPicPr>
+            <a:picLocks noChangeAspect="1"/>
+          </p:cNvPicPr>
+          <p:nvPr/>
+        </p:nvPicPr>
+        <p:blipFill>
+          <a:blip r:embed="rId6"/>
+          <a:stretch>
+            <a:fillRect/>
+          </a:stretch>
+        </p:blipFill>
+        <p:spPr>
+          <a:xfrm>
+            <a:off x="2286000" y="3492500"/>
+            <a:ext cx="2222500" cy="1651000"/>
+          </a:xfrm>
+          <a:prstGeom prst="rect">
+            <a:avLst/>
+          </a:prstGeom>
+        </p:spPr>
+      </p:pic>
+      <p:pic>
+        <p:nvPicPr>
+          <p:cNvPr id="10" name="Picture 9" descr="image.png"/>
+          <p:cNvPicPr>
+            <a:picLocks noChangeAspect="1"/>
+          </p:cNvPicPr>
+          <p:nvPr/>
+        </p:nvPicPr>
+        <p:blipFill>
+          <a:blip r:embed="rId7"/>
+          <a:stretch>
+            <a:fillRect/>
+          </a:stretch>
+        </p:blipFill>
+        <p:spPr>
+          <a:xfrm>
+            <a:off x="4572000" y="3492500"/>
+            <a:ext cx="2222500" cy="1651000"/>
+          </a:xfrm>
+          <a:prstGeom prst="rect">
+            <a:avLst/>
+          </a:prstGeom>
+        </p:spPr>
+      </p:pic>
+      <p:pic>
+        <p:nvPicPr>
+          <p:cNvPr id="11" name="Picture 10" descr="image.png"/>
+          <p:cNvPicPr>
+            <a:picLocks noChangeAspect="1"/>
+          </p:cNvPicPr>
+          <p:nvPr/>
+        </p:nvPicPr>
+        <p:blipFill>
+          <a:blip r:embed="rId8"/>
+          <a:stretch>
+            <a:fillRect/>
+          </a:stretch>
+        </p:blipFill>
+        <p:spPr>
+          <a:xfrm>
+            <a:off x="6858000" y="3492500"/>
+            <a:ext cx="2222500" cy="1651000"/>
+          </a:xfrm>
+          <a:prstGeom prst="rect">
+            <a:avLst/>
+          </a:prstGeom>
+        </p:spPr>
+      </p:pic>
     </p:spTree>
     <p:extLst>
       <p:ext uri="{BB962C8B-B14F-4D97-AF65-F5344CB8AC3E}">
@@ -5531,7 +5699,7 @@
           <a:p>
             <a:r>
               <a:rPr lang="en-US" dirty="0"/>
-              <a:t>*1*</a:t>
+              <a:t>5560 - State 3 - VT-07 On-Board Emissions</a:t>
             </a:r>
           </a:p>
         </p:txBody>
@@ -5573,6 +5741,174 @@
           </a:p>
         </p:txBody>
       </p:sp>
+      <p:pic>
+        <p:nvPicPr>
+          <p:cNvPr id="5" name="Picture 4" descr="image.png"/>
+          <p:cNvPicPr>
+            <a:picLocks noChangeAspect="1"/>
+          </p:cNvPicPr>
+          <p:nvPr/>
+        </p:nvPicPr>
+        <p:blipFill>
+          <a:blip r:embed="rId2"/>
+          <a:stretch>
+            <a:fillRect/>
+          </a:stretch>
+        </p:blipFill>
+        <p:spPr>
+          <a:xfrm>
+            <a:off x="12700" y="889000"/>
+            <a:ext cx="2959100" cy="2235200"/>
+          </a:xfrm>
+          <a:prstGeom prst="rect">
+            <a:avLst/>
+          </a:prstGeom>
+        </p:spPr>
+      </p:pic>
+      <p:pic>
+        <p:nvPicPr>
+          <p:cNvPr id="6" name="Picture 5" descr="image.png"/>
+          <p:cNvPicPr>
+            <a:picLocks noChangeAspect="1"/>
+          </p:cNvPicPr>
+          <p:nvPr/>
+        </p:nvPicPr>
+        <p:blipFill>
+          <a:blip r:embed="rId3"/>
+          <a:stretch>
+            <a:fillRect/>
+          </a:stretch>
+        </p:blipFill>
+        <p:spPr>
+          <a:xfrm>
+            <a:off x="3035300" y="889000"/>
+            <a:ext cx="2959100" cy="2235200"/>
+          </a:xfrm>
+          <a:prstGeom prst="rect">
+            <a:avLst/>
+          </a:prstGeom>
+        </p:spPr>
+      </p:pic>
+      <p:pic>
+        <p:nvPicPr>
+          <p:cNvPr id="7" name="Picture 6" descr="image.png"/>
+          <p:cNvPicPr>
+            <a:picLocks noChangeAspect="1"/>
+          </p:cNvPicPr>
+          <p:nvPr/>
+        </p:nvPicPr>
+        <p:blipFill>
+          <a:blip r:embed="rId4"/>
+          <a:stretch>
+            <a:fillRect/>
+          </a:stretch>
+        </p:blipFill>
+        <p:spPr>
+          <a:xfrm>
+            <a:off x="6057900" y="889000"/>
+            <a:ext cx="2959100" cy="2235200"/>
+          </a:xfrm>
+          <a:prstGeom prst="rect">
+            <a:avLst/>
+          </a:prstGeom>
+        </p:spPr>
+      </p:pic>
+      <p:pic>
+        <p:nvPicPr>
+          <p:cNvPr id="8" name="Picture 7" descr="image.png"/>
+          <p:cNvPicPr>
+            <a:picLocks noChangeAspect="1"/>
+          </p:cNvPicPr>
+          <p:nvPr/>
+        </p:nvPicPr>
+        <p:blipFill>
+          <a:blip r:embed="rId5"/>
+          <a:stretch>
+            <a:fillRect/>
+          </a:stretch>
+        </p:blipFill>
+        <p:spPr>
+          <a:xfrm>
+            <a:off x="12700" y="3492500"/>
+            <a:ext cx="2222500" cy="1651000"/>
+          </a:xfrm>
+          <a:prstGeom prst="rect">
+            <a:avLst/>
+          </a:prstGeom>
+        </p:spPr>
+      </p:pic>
+      <p:pic>
+        <p:nvPicPr>
+          <p:cNvPr id="9" name="Picture 8" descr="image.png"/>
+          <p:cNvPicPr>
+            <a:picLocks noChangeAspect="1"/>
+          </p:cNvPicPr>
+          <p:nvPr/>
+        </p:nvPicPr>
+        <p:blipFill>
+          <a:blip r:embed="rId6"/>
+          <a:stretch>
+            <a:fillRect/>
+          </a:stretch>
+        </p:blipFill>
+        <p:spPr>
+          <a:xfrm>
+            <a:off x="2286000" y="3492500"/>
+            <a:ext cx="2222500" cy="1651000"/>
+          </a:xfrm>
+          <a:prstGeom prst="rect">
+            <a:avLst/>
+          </a:prstGeom>
+        </p:spPr>
+      </p:pic>
+      <p:pic>
+        <p:nvPicPr>
+          <p:cNvPr id="10" name="Picture 9" descr="image.png"/>
+          <p:cNvPicPr>
+            <a:picLocks noChangeAspect="1"/>
+          </p:cNvPicPr>
+          <p:nvPr/>
+        </p:nvPicPr>
+        <p:blipFill>
+          <a:blip r:embed="rId7"/>
+          <a:stretch>
+            <a:fillRect/>
+          </a:stretch>
+        </p:blipFill>
+        <p:spPr>
+          <a:xfrm>
+            <a:off x="4572000" y="3492500"/>
+            <a:ext cx="2222500" cy="1651000"/>
+          </a:xfrm>
+          <a:prstGeom prst="rect">
+            <a:avLst/>
+          </a:prstGeom>
+        </p:spPr>
+      </p:pic>
+      <p:pic>
+        <p:nvPicPr>
+          <p:cNvPr id="11" name="Picture 10" descr="image.png"/>
+          <p:cNvPicPr>
+            <a:picLocks noChangeAspect="1"/>
+          </p:cNvPicPr>
+          <p:nvPr/>
+        </p:nvPicPr>
+        <p:blipFill>
+          <a:blip r:embed="rId8"/>
+          <a:stretch>
+            <a:fillRect/>
+          </a:stretch>
+        </p:blipFill>
+        <p:spPr>
+          <a:xfrm>
+            <a:off x="6858000" y="3492500"/>
+            <a:ext cx="2222500" cy="1651000"/>
+          </a:xfrm>
+          <a:prstGeom prst="rect">
+            <a:avLst/>
+          </a:prstGeom>
+        </p:spPr>
+      </p:pic>
     </p:spTree>
     <p:extLst>
       <p:ext uri="{BB962C8B-B14F-4D97-AF65-F5344CB8AC3E}">
@@ -6265,7 +6601,7 @@
           <a:p>
             <a:r>
               <a:rPr lang="en-US" dirty="0"/>
-              <a:t>*2*</a:t>
+              <a:t>5560 - State 2 - VT-07 On-Board Emissions</a:t>
             </a:r>
           </a:p>
         </p:txBody>
@@ -6307,6 +6643,174 @@
           </a:p>
         </p:txBody>
       </p:sp>
+      <p:pic>
+        <p:nvPicPr>
+          <p:cNvPr id="5" name="Picture 4" descr="image.png"/>
+          <p:cNvPicPr>
+            <a:picLocks noChangeAspect="1"/>
+          </p:cNvPicPr>
+          <p:nvPr/>
+        </p:nvPicPr>
+        <p:blipFill>
+          <a:blip r:embed="rId2"/>
+          <a:stretch>
+            <a:fillRect/>
+          </a:stretch>
+        </p:blipFill>
+        <p:spPr>
+          <a:xfrm>
+            <a:off x="12700" y="889000"/>
+            <a:ext cx="2959100" cy="2235200"/>
+          </a:xfrm>
+          <a:prstGeom prst="rect">
+            <a:avLst/>
+          </a:prstGeom>
+        </p:spPr>
+      </p:pic>
+      <p:pic>
+        <p:nvPicPr>
+          <p:cNvPr id="6" name="Picture 5" descr="image.png"/>
+          <p:cNvPicPr>
+            <a:picLocks noChangeAspect="1"/>
+          </p:cNvPicPr>
+          <p:nvPr/>
+        </p:nvPicPr>
+        <p:blipFill>
+          <a:blip r:embed="rId3"/>
+          <a:stretch>
+            <a:fillRect/>
+          </a:stretch>
+        </p:blipFill>
+        <p:spPr>
+          <a:xfrm>
+            <a:off x="3035300" y="889000"/>
+            <a:ext cx="2959100" cy="2235200"/>
+          </a:xfrm>
+          <a:prstGeom prst="rect">
+            <a:avLst/>
+          </a:prstGeom>
+        </p:spPr>
+      </p:pic>
+      <p:pic>
+        <p:nvPicPr>
+          <p:cNvPr id="7" name="Picture 6" descr="image.png"/>
+          <p:cNvPicPr>
+            <a:picLocks noChangeAspect="1"/>
+          </p:cNvPicPr>
+          <p:nvPr/>
+        </p:nvPicPr>
+        <p:blipFill>
+          <a:blip r:embed="rId4"/>
+          <a:stretch>
+            <a:fillRect/>
+          </a:stretch>
+        </p:blipFill>
+        <p:spPr>
+          <a:xfrm>
+            <a:off x="6057900" y="889000"/>
+            <a:ext cx="2959100" cy="2235200"/>
+          </a:xfrm>
+          <a:prstGeom prst="rect">
+            <a:avLst/>
+          </a:prstGeom>
+        </p:spPr>
+      </p:pic>
+      <p:pic>
+        <p:nvPicPr>
+          <p:cNvPr id="8" name="Picture 7" descr="image.png"/>
+          <p:cNvPicPr>
+            <a:picLocks noChangeAspect="1"/>
+          </p:cNvPicPr>
+          <p:nvPr/>
+        </p:nvPicPr>
+        <p:blipFill>
+          <a:blip r:embed="rId5"/>
+          <a:stretch>
+            <a:fillRect/>
+          </a:stretch>
+        </p:blipFill>
+        <p:spPr>
+          <a:xfrm>
+            <a:off x="12700" y="3492500"/>
+            <a:ext cx="2222500" cy="1651000"/>
+          </a:xfrm>
+          <a:prstGeom prst="rect">
+            <a:avLst/>
+          </a:prstGeom>
+        </p:spPr>
+      </p:pic>
+      <p:pic>
+        <p:nvPicPr>
+          <p:cNvPr id="9" name="Picture 8" descr="image.png"/>
+          <p:cNvPicPr>
+            <a:picLocks noChangeAspect="1"/>
+          </p:cNvPicPr>
+          <p:nvPr/>
+        </p:nvPicPr>
+        <p:blipFill>
+          <a:blip r:embed="rId6"/>
+          <a:stretch>
+            <a:fillRect/>
+          </a:stretch>
+        </p:blipFill>
+        <p:spPr>
+          <a:xfrm>
+            <a:off x="2286000" y="3492500"/>
+            <a:ext cx="2222500" cy="1651000"/>
+          </a:xfrm>
+          <a:prstGeom prst="rect">
+            <a:avLst/>
+          </a:prstGeom>
+        </p:spPr>
+      </p:pic>
+      <p:pic>
+        <p:nvPicPr>
+          <p:cNvPr id="10" name="Picture 9" descr="image.png"/>
+          <p:cNvPicPr>
+            <a:picLocks noChangeAspect="1"/>
+          </p:cNvPicPr>
+          <p:nvPr/>
+        </p:nvPicPr>
+        <p:blipFill>
+          <a:blip r:embed="rId7"/>
+          <a:stretch>
+            <a:fillRect/>
+          </a:stretch>
+        </p:blipFill>
+        <p:spPr>
+          <a:xfrm>
+            <a:off x="4572000" y="3492500"/>
+            <a:ext cx="2222500" cy="1651000"/>
+          </a:xfrm>
+          <a:prstGeom prst="rect">
+            <a:avLst/>
+          </a:prstGeom>
+        </p:spPr>
+      </p:pic>
+      <p:pic>
+        <p:nvPicPr>
+          <p:cNvPr id="11" name="Picture 10" descr="image.png"/>
+          <p:cNvPicPr>
+            <a:picLocks noChangeAspect="1"/>
+          </p:cNvPicPr>
+          <p:nvPr/>
+        </p:nvPicPr>
+        <p:blipFill>
+          <a:blip r:embed="rId8"/>
+          <a:stretch>
+            <a:fillRect/>
+          </a:stretch>
+        </p:blipFill>
+        <p:spPr>
+          <a:xfrm>
+            <a:off x="6858000" y="3492500"/>
+            <a:ext cx="2222500" cy="1651000"/>
+          </a:xfrm>
+          <a:prstGeom prst="rect">
+            <a:avLst/>
+          </a:prstGeom>
+        </p:spPr>
+      </p:pic>
     </p:spTree>
     <p:extLst>
       <p:ext uri="{BB962C8B-B14F-4D97-AF65-F5344CB8AC3E}">

</xml_diff>

<commit_message>
Added more logging and dictionaries
</commit_message>
<xml_diff>
--- a/newDeck.pptx
+++ b/newDeck.pptx
@@ -4112,7 +4112,7 @@
           <a:p>
             <a:r>
               <a:rPr lang="en-US" dirty="0"/>
-              <a:t>5537 - State 2 - RRNB - VT-01 Off-Board Emissions 3m</a:t>
+              <a:t>5537 - State 2 - RRNB | VT-01 Off-Board Emissions (3m)</a:t>
             </a:r>
           </a:p>
         </p:txBody>
@@ -5555,7 +5555,7 @@
           <a:p>
             <a:r>
               <a:rPr lang="en-US" dirty="0"/>
-              <a:t>5537 - State 1 - FRNB - VT-01 Off-Board Emissions 3m</a:t>
+              <a:t>5537 - State 1 - FRNB | VT-01 Off-Board Emissions (3m)</a:t>
             </a:r>
           </a:p>
         </p:txBody>
@@ -6313,7 +6313,7 @@
           <a:p>
             <a:r>
               <a:rPr lang="en-US" dirty="0"/>
-              <a:t>*2*</a:t>
+              <a:t>5537 - State 3 - FLNB | VT-01 Off-Board Emissions (3m)</a:t>
             </a:r>
           </a:p>
         </p:txBody>
@@ -6355,6 +6355,30 @@
           </a:p>
         </p:txBody>
       </p:sp>
+      <p:pic>
+        <p:nvPicPr>
+          <p:cNvPr id="5" name="Picture 4" descr="image.png"/>
+          <p:cNvPicPr>
+            <a:picLocks noChangeAspect="1"/>
+          </p:cNvPicPr>
+          <p:nvPr/>
+        </p:nvPicPr>
+        <p:blipFill>
+          <a:blip r:embed="rId2"/>
+          <a:stretch>
+            <a:fillRect/>
+          </a:stretch>
+        </p:blipFill>
+        <p:spPr>
+          <a:xfrm>
+            <a:off x="12700" y="889000"/>
+            <a:ext cx="2959100" cy="2235200"/>
+          </a:xfrm>
+          <a:prstGeom prst="rect">
+            <a:avLst/>
+          </a:prstGeom>
+        </p:spPr>
+      </p:pic>
     </p:spTree>
     <p:extLst>
       <p:ext uri="{BB962C8B-B14F-4D97-AF65-F5344CB8AC3E}">
@@ -6442,7 +6466,7 @@
           <a:p>
             <a:r>
               <a:rPr lang="en-US" dirty="0"/>
-              <a:t>*3*</a:t>
+              <a:t>5537 - State 4 - RLNB | VT-01 Off-Board Emissions (3m)</a:t>
             </a:r>
           </a:p>
         </p:txBody>
@@ -6484,6 +6508,30 @@
           </a:p>
         </p:txBody>
       </p:sp>
+      <p:pic>
+        <p:nvPicPr>
+          <p:cNvPr id="5" name="Picture 4" descr="image.png"/>
+          <p:cNvPicPr>
+            <a:picLocks noChangeAspect="1"/>
+          </p:cNvPicPr>
+          <p:nvPr/>
+        </p:nvPicPr>
+        <p:blipFill>
+          <a:blip r:embed="rId2"/>
+          <a:stretch>
+            <a:fillRect/>
+          </a:stretch>
+        </p:blipFill>
+        <p:spPr>
+          <a:xfrm>
+            <a:off x="12700" y="889000"/>
+            <a:ext cx="2959100" cy="2235200"/>
+          </a:xfrm>
+          <a:prstGeom prst="rect">
+            <a:avLst/>
+          </a:prstGeom>
+        </p:spPr>
+      </p:pic>
     </p:spTree>
     <p:extLst>
       <p:ext uri="{BB962C8B-B14F-4D97-AF65-F5344CB8AC3E}">

</xml_diff>

<commit_message>
Made compatible with windows
Changed PIL import
</commit_message>
<xml_diff>
--- a/newDeck.pptx
+++ b/newDeck.pptx
@@ -4139,7 +4139,7 @@
           <a:p>
             <a:r>
               <a:rPr lang="en-US" sz="1600" dirty="0"/>
-              <a:t>5582 - State 5 FLNB | VT-01 Off-Board Emissions (3m)</a:t>
+              <a:t>5537_-_State_4_-_RLNB | VT-01 Off-Board Emissions (3m)</a:t>
             </a:r>
           </a:p>
         </p:txBody>
@@ -5601,7 +5601,7 @@
           <a:p>
             <a:r>
               <a:rPr lang="en-US" sz="1600" dirty="0"/>
-              <a:t>5582 - State 3 RRBB | VT-01 Off-Board Emissions (3m)</a:t>
+              <a:t>5537_-_State_5_-_RLBB | VT-01 Off-Board Emissions (3m)</a:t>
             </a:r>
           </a:p>
         </p:txBody>
@@ -7068,7 +7068,7 @@
           <a:p>
             <a:r>
               <a:rPr lang="en-US" sz="1600" dirty="0"/>
-              <a:t>5582 - State 2 FRBB | VT-01 Off-Board Emissions (3m)</a:t>
+              <a:t>5537_-_State_6_-_FLBB | VT-01 Off-Board Emissions (3m)</a:t>
             </a:r>
           </a:p>
         </p:txBody>
@@ -8535,7 +8535,7 @@
           <a:p>
             <a:r>
               <a:rPr lang="en-US" dirty="0"/>
-              <a:t>5582 - State 4 RRNB | VT-01 Off-Board Emissions (3m)</a:t>
+              <a:t>5537_-_State_7_-_RRBB | VT-01 Off-Board Emissions (3m)</a:t>
             </a:r>
           </a:p>
         </p:txBody>
@@ -10002,7 +10002,7 @@
           <a:p>
             <a:r>
               <a:rPr lang="en-US" dirty="0"/>
-              <a:t>5582 - State 6 FLBB | VT-01 Off-Board Emissions (3m)</a:t>
+              <a:t>5537_-_State_28_-_CE | VT-12 Conducted Emissions (Single Phase)</a:t>
             </a:r>
           </a:p>
         </p:txBody>
@@ -10397,7 +10397,7 @@
           <a:p>
             <a:r>
               <a:rPr lang="en-US" dirty="0"/>
-              <a:t>5582 - State 1 FRNB | VT-01 Off-Board Emissions (3m)</a:t>
+              <a:t>5537_-_State_29_-_CE | VT-12 Conducted Emissions (Single Phase)</a:t>
             </a:r>
           </a:p>
         </p:txBody>
@@ -10574,7 +10574,7 @@
           <a:p>
             <a:r>
               <a:rPr lang="en-US" dirty="0"/>
-              <a:t>5582 - State 9 | VT-07 On-Board Emissions</a:t>
+              <a:t>5537_-_State_35_Rear_E_Field | VT-15 Electric Fields</a:t>
             </a:r>
           </a:p>
         </p:txBody>
@@ -10632,7 +10632,7 @@
         </p:blipFill>
         <p:spPr>
           <a:xfrm>
-            <a:off x="12700" y="889000"/>
+            <a:off x="12700" y="1079500"/>
             <a:ext cx="2959100" cy="2235200"/>
           </a:xfrm>
           <a:prstGeom prst="rect">
@@ -10656,7 +10656,7 @@
         </p:blipFill>
         <p:spPr>
           <a:xfrm>
-            <a:off x="3035300" y="889000"/>
+            <a:off x="3035300" y="1079500"/>
             <a:ext cx="2959100" cy="2235200"/>
           </a:xfrm>
           <a:prstGeom prst="rect">
@@ -10680,104 +10680,8 @@
         </p:blipFill>
         <p:spPr>
           <a:xfrm>
-            <a:off x="6057900" y="889000"/>
+            <a:off x="6057900" y="1079500"/>
             <a:ext cx="2959100" cy="2235200"/>
-          </a:xfrm>
-          <a:prstGeom prst="rect">
-            <a:avLst/>
-          </a:prstGeom>
-        </p:spPr>
-      </p:pic>
-      <p:pic>
-        <p:nvPicPr>
-          <p:cNvPr id="8" name="Picture 7" descr="image.png"/>
-          <p:cNvPicPr>
-            <a:picLocks noChangeAspect="1"/>
-          </p:cNvPicPr>
-          <p:nvPr/>
-        </p:nvPicPr>
-        <p:blipFill>
-          <a:blip r:embed="rId5"/>
-          <a:stretch>
-            <a:fillRect/>
-          </a:stretch>
-        </p:blipFill>
-        <p:spPr>
-          <a:xfrm>
-            <a:off x="12700" y="3492500"/>
-            <a:ext cx="2222500" cy="1651000"/>
-          </a:xfrm>
-          <a:prstGeom prst="rect">
-            <a:avLst/>
-          </a:prstGeom>
-        </p:spPr>
-      </p:pic>
-      <p:pic>
-        <p:nvPicPr>
-          <p:cNvPr id="9" name="Picture 8" descr="image.png"/>
-          <p:cNvPicPr>
-            <a:picLocks noChangeAspect="1"/>
-          </p:cNvPicPr>
-          <p:nvPr/>
-        </p:nvPicPr>
-        <p:blipFill>
-          <a:blip r:embed="rId6"/>
-          <a:stretch>
-            <a:fillRect/>
-          </a:stretch>
-        </p:blipFill>
-        <p:spPr>
-          <a:xfrm>
-            <a:off x="2286000" y="3492500"/>
-            <a:ext cx="2222500" cy="1651000"/>
-          </a:xfrm>
-          <a:prstGeom prst="rect">
-            <a:avLst/>
-          </a:prstGeom>
-        </p:spPr>
-      </p:pic>
-      <p:pic>
-        <p:nvPicPr>
-          <p:cNvPr id="10" name="Picture 9" descr="image.png"/>
-          <p:cNvPicPr>
-            <a:picLocks noChangeAspect="1"/>
-          </p:cNvPicPr>
-          <p:nvPr/>
-        </p:nvPicPr>
-        <p:blipFill>
-          <a:blip r:embed="rId7"/>
-          <a:stretch>
-            <a:fillRect/>
-          </a:stretch>
-        </p:blipFill>
-        <p:spPr>
-          <a:xfrm>
-            <a:off x="4572000" y="3492500"/>
-            <a:ext cx="2222500" cy="1651000"/>
-          </a:xfrm>
-          <a:prstGeom prst="rect">
-            <a:avLst/>
-          </a:prstGeom>
-        </p:spPr>
-      </p:pic>
-      <p:pic>
-        <p:nvPicPr>
-          <p:cNvPr id="11" name="Picture 10" descr="image.png"/>
-          <p:cNvPicPr>
-            <a:picLocks noChangeAspect="1"/>
-          </p:cNvPicPr>
-          <p:nvPr/>
-        </p:nvPicPr>
-        <p:blipFill>
-          <a:blip r:embed="rId8"/>
-          <a:stretch>
-            <a:fillRect/>
-          </a:stretch>
-        </p:blipFill>
-        <p:spPr>
-          <a:xfrm>
-            <a:off x="6858000" y="3492500"/>
-            <a:ext cx="2222500" cy="1651000"/>
           </a:xfrm>
           <a:prstGeom prst="rect">
             <a:avLst/>
@@ -10871,7 +10775,7 @@
           <a:p>
             <a:r>
               <a:rPr lang="en-US" dirty="0"/>
-              <a:t>5582 - State 10 | VT-07 On-Board Emissions</a:t>
+              <a:t>5537_-_State_37_LHS_E_Field | VT-15 Electric Fields</a:t>
             </a:r>
           </a:p>
         </p:txBody>
@@ -10929,7 +10833,7 @@
         </p:blipFill>
         <p:spPr>
           <a:xfrm>
-            <a:off x="12700" y="889000"/>
+            <a:off x="12700" y="1079500"/>
             <a:ext cx="2959100" cy="2235200"/>
           </a:xfrm>
           <a:prstGeom prst="rect">
@@ -10953,7 +10857,7 @@
         </p:blipFill>
         <p:spPr>
           <a:xfrm>
-            <a:off x="3035300" y="889000"/>
+            <a:off x="3035300" y="1079500"/>
             <a:ext cx="2959100" cy="2235200"/>
           </a:xfrm>
           <a:prstGeom prst="rect">
@@ -10977,104 +10881,8 @@
         </p:blipFill>
         <p:spPr>
           <a:xfrm>
-            <a:off x="6057900" y="889000"/>
+            <a:off x="6057900" y="1079500"/>
             <a:ext cx="2959100" cy="2235200"/>
-          </a:xfrm>
-          <a:prstGeom prst="rect">
-            <a:avLst/>
-          </a:prstGeom>
-        </p:spPr>
-      </p:pic>
-      <p:pic>
-        <p:nvPicPr>
-          <p:cNvPr id="8" name="Picture 7" descr="image.png"/>
-          <p:cNvPicPr>
-            <a:picLocks noChangeAspect="1"/>
-          </p:cNvPicPr>
-          <p:nvPr/>
-        </p:nvPicPr>
-        <p:blipFill>
-          <a:blip r:embed="rId5"/>
-          <a:stretch>
-            <a:fillRect/>
-          </a:stretch>
-        </p:blipFill>
-        <p:spPr>
-          <a:xfrm>
-            <a:off x="12700" y="3492500"/>
-            <a:ext cx="2222500" cy="1651000"/>
-          </a:xfrm>
-          <a:prstGeom prst="rect">
-            <a:avLst/>
-          </a:prstGeom>
-        </p:spPr>
-      </p:pic>
-      <p:pic>
-        <p:nvPicPr>
-          <p:cNvPr id="9" name="Picture 8" descr="image.png"/>
-          <p:cNvPicPr>
-            <a:picLocks noChangeAspect="1"/>
-          </p:cNvPicPr>
-          <p:nvPr/>
-        </p:nvPicPr>
-        <p:blipFill>
-          <a:blip r:embed="rId6"/>
-          <a:stretch>
-            <a:fillRect/>
-          </a:stretch>
-        </p:blipFill>
-        <p:spPr>
-          <a:xfrm>
-            <a:off x="2286000" y="3492500"/>
-            <a:ext cx="2222500" cy="1651000"/>
-          </a:xfrm>
-          <a:prstGeom prst="rect">
-            <a:avLst/>
-          </a:prstGeom>
-        </p:spPr>
-      </p:pic>
-      <p:pic>
-        <p:nvPicPr>
-          <p:cNvPr id="10" name="Picture 9" descr="image.png"/>
-          <p:cNvPicPr>
-            <a:picLocks noChangeAspect="1"/>
-          </p:cNvPicPr>
-          <p:nvPr/>
-        </p:nvPicPr>
-        <p:blipFill>
-          <a:blip r:embed="rId7"/>
-          <a:stretch>
-            <a:fillRect/>
-          </a:stretch>
-        </p:blipFill>
-        <p:spPr>
-          <a:xfrm>
-            <a:off x="4572000" y="3492500"/>
-            <a:ext cx="2222500" cy="1651000"/>
-          </a:xfrm>
-          <a:prstGeom prst="rect">
-            <a:avLst/>
-          </a:prstGeom>
-        </p:spPr>
-      </p:pic>
-      <p:pic>
-        <p:nvPicPr>
-          <p:cNvPr id="11" name="Picture 10" descr="image.png"/>
-          <p:cNvPicPr>
-            <a:picLocks noChangeAspect="1"/>
-          </p:cNvPicPr>
-          <p:nvPr/>
-        </p:nvPicPr>
-        <p:blipFill>
-          <a:blip r:embed="rId8"/>
-          <a:stretch>
-            <a:fillRect/>
-          </a:stretch>
-        </p:blipFill>
-        <p:spPr>
-          <a:xfrm>
-            <a:off x="6858000" y="3492500"/>
-            <a:ext cx="2222500" cy="1651000"/>
           </a:xfrm>
           <a:prstGeom prst="rect">
             <a:avLst/>
@@ -11168,7 +10976,7 @@
           <a:p>
             <a:r>
               <a:rPr lang="en-US" dirty="0"/>
-              <a:t>5582 - State 11 | VT-07 On-Board Emissions</a:t>
+              <a:t>5537_-_State_32_Rear_H_Field | VT-15 Magnetic Fields</a:t>
             </a:r>
           </a:p>
         </p:txBody>
@@ -11226,8 +11034,8 @@
         </p:blipFill>
         <p:spPr>
           <a:xfrm>
-            <a:off x="12700" y="889000"/>
-            <a:ext cx="2959100" cy="2235200"/>
+            <a:off x="12700" y="825500"/>
+            <a:ext cx="2806700" cy="2120900"/>
           </a:xfrm>
           <a:prstGeom prst="rect">
             <a:avLst/>
@@ -11250,8 +11058,8 @@
         </p:blipFill>
         <p:spPr>
           <a:xfrm>
-            <a:off x="3035300" y="889000"/>
-            <a:ext cx="2959100" cy="2235200"/>
+            <a:off x="3035300" y="825500"/>
+            <a:ext cx="2806700" cy="2120900"/>
           </a:xfrm>
           <a:prstGeom prst="rect">
             <a:avLst/>
@@ -11274,8 +11082,8 @@
         </p:blipFill>
         <p:spPr>
           <a:xfrm>
-            <a:off x="6057900" y="889000"/>
-            <a:ext cx="2959100" cy="2235200"/>
+            <a:off x="6057900" y="825500"/>
+            <a:ext cx="2806700" cy="2120900"/>
           </a:xfrm>
           <a:prstGeom prst="rect">
             <a:avLst/>
@@ -11298,8 +11106,8 @@
         </p:blipFill>
         <p:spPr>
           <a:xfrm>
-            <a:off x="12700" y="3492500"/>
-            <a:ext cx="2222500" cy="1651000"/>
+            <a:off x="12700" y="2984500"/>
+            <a:ext cx="2806700" cy="2120900"/>
           </a:xfrm>
           <a:prstGeom prst="rect">
             <a:avLst/>
@@ -11322,8 +11130,8 @@
         </p:blipFill>
         <p:spPr>
           <a:xfrm>
-            <a:off x="2286000" y="3492500"/>
-            <a:ext cx="2222500" cy="1651000"/>
+            <a:off x="3035300" y="2984500"/>
+            <a:ext cx="2806700" cy="2120900"/>
           </a:xfrm>
           <a:prstGeom prst="rect">
             <a:avLst/>
@@ -11346,32 +11154,8 @@
         </p:blipFill>
         <p:spPr>
           <a:xfrm>
-            <a:off x="4572000" y="3492500"/>
-            <a:ext cx="2222500" cy="1651000"/>
-          </a:xfrm>
-          <a:prstGeom prst="rect">
-            <a:avLst/>
-          </a:prstGeom>
-        </p:spPr>
-      </p:pic>
-      <p:pic>
-        <p:nvPicPr>
-          <p:cNvPr id="11" name="Picture 10" descr="image.png"/>
-          <p:cNvPicPr>
-            <a:picLocks noChangeAspect="1"/>
-          </p:cNvPicPr>
-          <p:nvPr/>
-        </p:nvPicPr>
-        <p:blipFill>
-          <a:blip r:embed="rId8"/>
-          <a:stretch>
-            <a:fillRect/>
-          </a:stretch>
-        </p:blipFill>
-        <p:spPr>
-          <a:xfrm>
-            <a:off x="6858000" y="3492500"/>
-            <a:ext cx="2222500" cy="1651000"/>
+            <a:off x="6057900" y="2984500"/>
+            <a:ext cx="2806700" cy="2120900"/>
           </a:xfrm>
           <a:prstGeom prst="rect">
             <a:avLst/>

</xml_diff>

<commit_message>
Added all btn functionality
Go to directory, clear directories
</commit_message>
<xml_diff>
--- a/newDeck.pptx
+++ b/newDeck.pptx
@@ -4139,7 +4139,7 @@
           <a:p>
             <a:r>
               <a:rPr lang="en-US" sz="1600" dirty="0"/>
-              <a:t>5537_-_State_4_-_RLNB | VT-01 Off-Board Emissions (3m)</a:t>
+              <a:t>5537_-_State_4_-_RLNB - Copy | VT-01 Off-Board Emissions (3m)</a:t>
             </a:r>
           </a:p>
         </p:txBody>
@@ -4208,294 +4208,6 @@
       <p:pic>
         <p:nvPicPr>
           <p:cNvPr id="6" name="Picture 5" descr="image.png"/>
-          <p:cNvPicPr>
-            <a:picLocks noChangeAspect="1"/>
-          </p:cNvPicPr>
-          <p:nvPr/>
-        </p:nvPicPr>
-        <p:blipFill>
-          <a:blip r:embed="rId3"/>
-          <a:stretch>
-            <a:fillRect/>
-          </a:stretch>
-        </p:blipFill>
-        <p:spPr>
-          <a:xfrm>
-            <a:off x="4572000" y="1079500"/>
-            <a:ext cx="4546600" cy="3429000"/>
-          </a:xfrm>
-          <a:prstGeom prst="rect">
-            <a:avLst/>
-          </a:prstGeom>
-        </p:spPr>
-      </p:pic>
-      <p:pic>
-        <p:nvPicPr>
-          <p:cNvPr id="7" name="Picture 6" descr="image.png"/>
-          <p:cNvPicPr>
-            <a:picLocks noChangeAspect="1"/>
-          </p:cNvPicPr>
-          <p:nvPr/>
-        </p:nvPicPr>
-        <p:blipFill>
-          <a:blip r:embed="rId2"/>
-          <a:stretch>
-            <a:fillRect/>
-          </a:stretch>
-        </p:blipFill>
-        <p:spPr>
-          <a:xfrm>
-            <a:off x="12700" y="1079500"/>
-            <a:ext cx="4546600" cy="3429000"/>
-          </a:xfrm>
-          <a:prstGeom prst="rect">
-            <a:avLst/>
-          </a:prstGeom>
-        </p:spPr>
-      </p:pic>
-      <p:pic>
-        <p:nvPicPr>
-          <p:cNvPr id="8" name="Picture 7" descr="image.png"/>
-          <p:cNvPicPr>
-            <a:picLocks noChangeAspect="1"/>
-          </p:cNvPicPr>
-          <p:nvPr/>
-        </p:nvPicPr>
-        <p:blipFill>
-          <a:blip r:embed="rId3"/>
-          <a:stretch>
-            <a:fillRect/>
-          </a:stretch>
-        </p:blipFill>
-        <p:spPr>
-          <a:xfrm>
-            <a:off x="4572000" y="1079500"/>
-            <a:ext cx="4546600" cy="3429000"/>
-          </a:xfrm>
-          <a:prstGeom prst="rect">
-            <a:avLst/>
-          </a:prstGeom>
-        </p:spPr>
-      </p:pic>
-      <p:pic>
-        <p:nvPicPr>
-          <p:cNvPr id="9" name="Picture 8" descr="image.png"/>
-          <p:cNvPicPr>
-            <a:picLocks noChangeAspect="1"/>
-          </p:cNvPicPr>
-          <p:nvPr/>
-        </p:nvPicPr>
-        <p:blipFill>
-          <a:blip r:embed="rId2"/>
-          <a:stretch>
-            <a:fillRect/>
-          </a:stretch>
-        </p:blipFill>
-        <p:spPr>
-          <a:xfrm>
-            <a:off x="12700" y="1079500"/>
-            <a:ext cx="4546600" cy="3429000"/>
-          </a:xfrm>
-          <a:prstGeom prst="rect">
-            <a:avLst/>
-          </a:prstGeom>
-        </p:spPr>
-      </p:pic>
-      <p:pic>
-        <p:nvPicPr>
-          <p:cNvPr id="10" name="Picture 9" descr="image.png"/>
-          <p:cNvPicPr>
-            <a:picLocks noChangeAspect="1"/>
-          </p:cNvPicPr>
-          <p:nvPr/>
-        </p:nvPicPr>
-        <p:blipFill>
-          <a:blip r:embed="rId3"/>
-          <a:stretch>
-            <a:fillRect/>
-          </a:stretch>
-        </p:blipFill>
-        <p:spPr>
-          <a:xfrm>
-            <a:off x="4572000" y="1079500"/>
-            <a:ext cx="4546600" cy="3429000"/>
-          </a:xfrm>
-          <a:prstGeom prst="rect">
-            <a:avLst/>
-          </a:prstGeom>
-        </p:spPr>
-      </p:pic>
-      <p:pic>
-        <p:nvPicPr>
-          <p:cNvPr id="11" name="Picture 10" descr="image.png"/>
-          <p:cNvPicPr>
-            <a:picLocks noChangeAspect="1"/>
-          </p:cNvPicPr>
-          <p:nvPr/>
-        </p:nvPicPr>
-        <p:blipFill>
-          <a:blip r:embed="rId2"/>
-          <a:stretch>
-            <a:fillRect/>
-          </a:stretch>
-        </p:blipFill>
-        <p:spPr>
-          <a:xfrm>
-            <a:off x="12700" y="1079500"/>
-            <a:ext cx="4546600" cy="3429000"/>
-          </a:xfrm>
-          <a:prstGeom prst="rect">
-            <a:avLst/>
-          </a:prstGeom>
-        </p:spPr>
-      </p:pic>
-      <p:pic>
-        <p:nvPicPr>
-          <p:cNvPr id="12" name="Picture 11" descr="image.png"/>
-          <p:cNvPicPr>
-            <a:picLocks noChangeAspect="1"/>
-          </p:cNvPicPr>
-          <p:nvPr/>
-        </p:nvPicPr>
-        <p:blipFill>
-          <a:blip r:embed="rId3"/>
-          <a:stretch>
-            <a:fillRect/>
-          </a:stretch>
-        </p:blipFill>
-        <p:spPr>
-          <a:xfrm>
-            <a:off x="4572000" y="1079500"/>
-            <a:ext cx="4546600" cy="3429000"/>
-          </a:xfrm>
-          <a:prstGeom prst="rect">
-            <a:avLst/>
-          </a:prstGeom>
-        </p:spPr>
-      </p:pic>
-      <p:pic>
-        <p:nvPicPr>
-          <p:cNvPr id="13" name="Picture 12" descr="image.png"/>
-          <p:cNvPicPr>
-            <a:picLocks noChangeAspect="1"/>
-          </p:cNvPicPr>
-          <p:nvPr/>
-        </p:nvPicPr>
-        <p:blipFill>
-          <a:blip r:embed="rId2"/>
-          <a:stretch>
-            <a:fillRect/>
-          </a:stretch>
-        </p:blipFill>
-        <p:spPr>
-          <a:xfrm>
-            <a:off x="12700" y="1079500"/>
-            <a:ext cx="4546600" cy="3429000"/>
-          </a:xfrm>
-          <a:prstGeom prst="rect">
-            <a:avLst/>
-          </a:prstGeom>
-        </p:spPr>
-      </p:pic>
-      <p:pic>
-        <p:nvPicPr>
-          <p:cNvPr id="14" name="Picture 13" descr="image.png"/>
-          <p:cNvPicPr>
-            <a:picLocks noChangeAspect="1"/>
-          </p:cNvPicPr>
-          <p:nvPr/>
-        </p:nvPicPr>
-        <p:blipFill>
-          <a:blip r:embed="rId3"/>
-          <a:stretch>
-            <a:fillRect/>
-          </a:stretch>
-        </p:blipFill>
-        <p:spPr>
-          <a:xfrm>
-            <a:off x="4572000" y="1079500"/>
-            <a:ext cx="4546600" cy="3429000"/>
-          </a:xfrm>
-          <a:prstGeom prst="rect">
-            <a:avLst/>
-          </a:prstGeom>
-        </p:spPr>
-      </p:pic>
-      <p:pic>
-        <p:nvPicPr>
-          <p:cNvPr id="15" name="Picture 14" descr="image.png"/>
-          <p:cNvPicPr>
-            <a:picLocks noChangeAspect="1"/>
-          </p:cNvPicPr>
-          <p:nvPr/>
-        </p:nvPicPr>
-        <p:blipFill>
-          <a:blip r:embed="rId2"/>
-          <a:stretch>
-            <a:fillRect/>
-          </a:stretch>
-        </p:blipFill>
-        <p:spPr>
-          <a:xfrm>
-            <a:off x="12700" y="1079500"/>
-            <a:ext cx="4546600" cy="3429000"/>
-          </a:xfrm>
-          <a:prstGeom prst="rect">
-            <a:avLst/>
-          </a:prstGeom>
-        </p:spPr>
-      </p:pic>
-      <p:pic>
-        <p:nvPicPr>
-          <p:cNvPr id="16" name="Picture 15" descr="image.png"/>
-          <p:cNvPicPr>
-            <a:picLocks noChangeAspect="1"/>
-          </p:cNvPicPr>
-          <p:nvPr/>
-        </p:nvPicPr>
-        <p:blipFill>
-          <a:blip r:embed="rId3"/>
-          <a:stretch>
-            <a:fillRect/>
-          </a:stretch>
-        </p:blipFill>
-        <p:spPr>
-          <a:xfrm>
-            <a:off x="4572000" y="1079500"/>
-            <a:ext cx="4546600" cy="3429000"/>
-          </a:xfrm>
-          <a:prstGeom prst="rect">
-            <a:avLst/>
-          </a:prstGeom>
-        </p:spPr>
-      </p:pic>
-      <p:pic>
-        <p:nvPicPr>
-          <p:cNvPr id="17" name="Picture 16" descr="image.png"/>
-          <p:cNvPicPr>
-            <a:picLocks noChangeAspect="1"/>
-          </p:cNvPicPr>
-          <p:nvPr/>
-        </p:nvPicPr>
-        <p:blipFill>
-          <a:blip r:embed="rId2"/>
-          <a:stretch>
-            <a:fillRect/>
-          </a:stretch>
-        </p:blipFill>
-        <p:spPr>
-          <a:xfrm>
-            <a:off x="12700" y="1079500"/>
-            <a:ext cx="4546600" cy="3429000"/>
-          </a:xfrm>
-          <a:prstGeom prst="rect">
-            <a:avLst/>
-          </a:prstGeom>
-        </p:spPr>
-      </p:pic>
-      <p:pic>
-        <p:nvPicPr>
-          <p:cNvPr id="18" name="Picture 17" descr="image.png"/>
           <p:cNvPicPr>
             <a:picLocks noChangeAspect="1"/>
           </p:cNvPicPr>
@@ -5889,7 +5601,7 @@
           <a:p>
             <a:r>
               <a:rPr lang="en-US" sz="1600" dirty="0"/>
-              <a:t>5537_-_State_5_-_RLBB | VT-01 Off-Board Emissions (3m)</a:t>
+              <a:t>5537_-_State_4_-_RLNB | VT-01 Off-Board Emissions (3m)</a:t>
             </a:r>
           </a:p>
         </p:txBody>
@@ -5958,294 +5670,6 @@
       <p:pic>
         <p:nvPicPr>
           <p:cNvPr id="6" name="Picture 5" descr="image.png"/>
-          <p:cNvPicPr>
-            <a:picLocks noChangeAspect="1"/>
-          </p:cNvPicPr>
-          <p:nvPr/>
-        </p:nvPicPr>
-        <p:blipFill>
-          <a:blip r:embed="rId3"/>
-          <a:stretch>
-            <a:fillRect/>
-          </a:stretch>
-        </p:blipFill>
-        <p:spPr>
-          <a:xfrm>
-            <a:off x="4572000" y="1079500"/>
-            <a:ext cx="4546600" cy="3429000"/>
-          </a:xfrm>
-          <a:prstGeom prst="rect">
-            <a:avLst/>
-          </a:prstGeom>
-        </p:spPr>
-      </p:pic>
-      <p:pic>
-        <p:nvPicPr>
-          <p:cNvPr id="7" name="Picture 6" descr="image.png"/>
-          <p:cNvPicPr>
-            <a:picLocks noChangeAspect="1"/>
-          </p:cNvPicPr>
-          <p:nvPr/>
-        </p:nvPicPr>
-        <p:blipFill>
-          <a:blip r:embed="rId2"/>
-          <a:stretch>
-            <a:fillRect/>
-          </a:stretch>
-        </p:blipFill>
-        <p:spPr>
-          <a:xfrm>
-            <a:off x="12700" y="1079500"/>
-            <a:ext cx="4546600" cy="3429000"/>
-          </a:xfrm>
-          <a:prstGeom prst="rect">
-            <a:avLst/>
-          </a:prstGeom>
-        </p:spPr>
-      </p:pic>
-      <p:pic>
-        <p:nvPicPr>
-          <p:cNvPr id="8" name="Picture 7" descr="image.png"/>
-          <p:cNvPicPr>
-            <a:picLocks noChangeAspect="1"/>
-          </p:cNvPicPr>
-          <p:nvPr/>
-        </p:nvPicPr>
-        <p:blipFill>
-          <a:blip r:embed="rId3"/>
-          <a:stretch>
-            <a:fillRect/>
-          </a:stretch>
-        </p:blipFill>
-        <p:spPr>
-          <a:xfrm>
-            <a:off x="4572000" y="1079500"/>
-            <a:ext cx="4546600" cy="3429000"/>
-          </a:xfrm>
-          <a:prstGeom prst="rect">
-            <a:avLst/>
-          </a:prstGeom>
-        </p:spPr>
-      </p:pic>
-      <p:pic>
-        <p:nvPicPr>
-          <p:cNvPr id="9" name="Picture 8" descr="image.png"/>
-          <p:cNvPicPr>
-            <a:picLocks noChangeAspect="1"/>
-          </p:cNvPicPr>
-          <p:nvPr/>
-        </p:nvPicPr>
-        <p:blipFill>
-          <a:blip r:embed="rId2"/>
-          <a:stretch>
-            <a:fillRect/>
-          </a:stretch>
-        </p:blipFill>
-        <p:spPr>
-          <a:xfrm>
-            <a:off x="12700" y="1079500"/>
-            <a:ext cx="4546600" cy="3429000"/>
-          </a:xfrm>
-          <a:prstGeom prst="rect">
-            <a:avLst/>
-          </a:prstGeom>
-        </p:spPr>
-      </p:pic>
-      <p:pic>
-        <p:nvPicPr>
-          <p:cNvPr id="10" name="Picture 9" descr="image.png"/>
-          <p:cNvPicPr>
-            <a:picLocks noChangeAspect="1"/>
-          </p:cNvPicPr>
-          <p:nvPr/>
-        </p:nvPicPr>
-        <p:blipFill>
-          <a:blip r:embed="rId3"/>
-          <a:stretch>
-            <a:fillRect/>
-          </a:stretch>
-        </p:blipFill>
-        <p:spPr>
-          <a:xfrm>
-            <a:off x="4572000" y="1079500"/>
-            <a:ext cx="4546600" cy="3429000"/>
-          </a:xfrm>
-          <a:prstGeom prst="rect">
-            <a:avLst/>
-          </a:prstGeom>
-        </p:spPr>
-      </p:pic>
-      <p:pic>
-        <p:nvPicPr>
-          <p:cNvPr id="11" name="Picture 10" descr="image.png"/>
-          <p:cNvPicPr>
-            <a:picLocks noChangeAspect="1"/>
-          </p:cNvPicPr>
-          <p:nvPr/>
-        </p:nvPicPr>
-        <p:blipFill>
-          <a:blip r:embed="rId2"/>
-          <a:stretch>
-            <a:fillRect/>
-          </a:stretch>
-        </p:blipFill>
-        <p:spPr>
-          <a:xfrm>
-            <a:off x="12700" y="1079500"/>
-            <a:ext cx="4546600" cy="3429000"/>
-          </a:xfrm>
-          <a:prstGeom prst="rect">
-            <a:avLst/>
-          </a:prstGeom>
-        </p:spPr>
-      </p:pic>
-      <p:pic>
-        <p:nvPicPr>
-          <p:cNvPr id="12" name="Picture 11" descr="image.png"/>
-          <p:cNvPicPr>
-            <a:picLocks noChangeAspect="1"/>
-          </p:cNvPicPr>
-          <p:nvPr/>
-        </p:nvPicPr>
-        <p:blipFill>
-          <a:blip r:embed="rId3"/>
-          <a:stretch>
-            <a:fillRect/>
-          </a:stretch>
-        </p:blipFill>
-        <p:spPr>
-          <a:xfrm>
-            <a:off x="4572000" y="1079500"/>
-            <a:ext cx="4546600" cy="3429000"/>
-          </a:xfrm>
-          <a:prstGeom prst="rect">
-            <a:avLst/>
-          </a:prstGeom>
-        </p:spPr>
-      </p:pic>
-      <p:pic>
-        <p:nvPicPr>
-          <p:cNvPr id="13" name="Picture 12" descr="image.png"/>
-          <p:cNvPicPr>
-            <a:picLocks noChangeAspect="1"/>
-          </p:cNvPicPr>
-          <p:nvPr/>
-        </p:nvPicPr>
-        <p:blipFill>
-          <a:blip r:embed="rId2"/>
-          <a:stretch>
-            <a:fillRect/>
-          </a:stretch>
-        </p:blipFill>
-        <p:spPr>
-          <a:xfrm>
-            <a:off x="12700" y="1079500"/>
-            <a:ext cx="4546600" cy="3429000"/>
-          </a:xfrm>
-          <a:prstGeom prst="rect">
-            <a:avLst/>
-          </a:prstGeom>
-        </p:spPr>
-      </p:pic>
-      <p:pic>
-        <p:nvPicPr>
-          <p:cNvPr id="14" name="Picture 13" descr="image.png"/>
-          <p:cNvPicPr>
-            <a:picLocks noChangeAspect="1"/>
-          </p:cNvPicPr>
-          <p:nvPr/>
-        </p:nvPicPr>
-        <p:blipFill>
-          <a:blip r:embed="rId3"/>
-          <a:stretch>
-            <a:fillRect/>
-          </a:stretch>
-        </p:blipFill>
-        <p:spPr>
-          <a:xfrm>
-            <a:off x="4572000" y="1079500"/>
-            <a:ext cx="4546600" cy="3429000"/>
-          </a:xfrm>
-          <a:prstGeom prst="rect">
-            <a:avLst/>
-          </a:prstGeom>
-        </p:spPr>
-      </p:pic>
-      <p:pic>
-        <p:nvPicPr>
-          <p:cNvPr id="15" name="Picture 14" descr="image.png"/>
-          <p:cNvPicPr>
-            <a:picLocks noChangeAspect="1"/>
-          </p:cNvPicPr>
-          <p:nvPr/>
-        </p:nvPicPr>
-        <p:blipFill>
-          <a:blip r:embed="rId2"/>
-          <a:stretch>
-            <a:fillRect/>
-          </a:stretch>
-        </p:blipFill>
-        <p:spPr>
-          <a:xfrm>
-            <a:off x="12700" y="1079500"/>
-            <a:ext cx="4546600" cy="3429000"/>
-          </a:xfrm>
-          <a:prstGeom prst="rect">
-            <a:avLst/>
-          </a:prstGeom>
-        </p:spPr>
-      </p:pic>
-      <p:pic>
-        <p:nvPicPr>
-          <p:cNvPr id="16" name="Picture 15" descr="image.png"/>
-          <p:cNvPicPr>
-            <a:picLocks noChangeAspect="1"/>
-          </p:cNvPicPr>
-          <p:nvPr/>
-        </p:nvPicPr>
-        <p:blipFill>
-          <a:blip r:embed="rId3"/>
-          <a:stretch>
-            <a:fillRect/>
-          </a:stretch>
-        </p:blipFill>
-        <p:spPr>
-          <a:xfrm>
-            <a:off x="4572000" y="1079500"/>
-            <a:ext cx="4546600" cy="3429000"/>
-          </a:xfrm>
-          <a:prstGeom prst="rect">
-            <a:avLst/>
-          </a:prstGeom>
-        </p:spPr>
-      </p:pic>
-      <p:pic>
-        <p:nvPicPr>
-          <p:cNvPr id="17" name="Picture 16" descr="image.png"/>
-          <p:cNvPicPr>
-            <a:picLocks noChangeAspect="1"/>
-          </p:cNvPicPr>
-          <p:nvPr/>
-        </p:nvPicPr>
-        <p:blipFill>
-          <a:blip r:embed="rId2"/>
-          <a:stretch>
-            <a:fillRect/>
-          </a:stretch>
-        </p:blipFill>
-        <p:spPr>
-          <a:xfrm>
-            <a:off x="12700" y="1079500"/>
-            <a:ext cx="4546600" cy="3429000"/>
-          </a:xfrm>
-          <a:prstGeom prst="rect">
-            <a:avLst/>
-          </a:prstGeom>
-        </p:spPr>
-      </p:pic>
-      <p:pic>
-        <p:nvPicPr>
-          <p:cNvPr id="18" name="Picture 17" descr="image.png"/>
           <p:cNvPicPr>
             <a:picLocks noChangeAspect="1"/>
           </p:cNvPicPr>
@@ -7644,7 +7068,7 @@
           <a:p>
             <a:r>
               <a:rPr lang="en-US" sz="1600" dirty="0"/>
-              <a:t>5537_-_State_6_-_FLBB | VT-01 Off-Board Emissions (3m)</a:t>
+              <a:t>5537_-_State_5_-_RLBB - Copy | VT-01 Off-Board Emissions (3m)</a:t>
             </a:r>
           </a:p>
         </p:txBody>
@@ -7713,294 +7137,6 @@
       <p:pic>
         <p:nvPicPr>
           <p:cNvPr id="6" name="Picture 5" descr="image.png"/>
-          <p:cNvPicPr>
-            <a:picLocks noChangeAspect="1"/>
-          </p:cNvPicPr>
-          <p:nvPr/>
-        </p:nvPicPr>
-        <p:blipFill>
-          <a:blip r:embed="rId3"/>
-          <a:stretch>
-            <a:fillRect/>
-          </a:stretch>
-        </p:blipFill>
-        <p:spPr>
-          <a:xfrm>
-            <a:off x="4572000" y="1079500"/>
-            <a:ext cx="4546600" cy="3429000"/>
-          </a:xfrm>
-          <a:prstGeom prst="rect">
-            <a:avLst/>
-          </a:prstGeom>
-        </p:spPr>
-      </p:pic>
-      <p:pic>
-        <p:nvPicPr>
-          <p:cNvPr id="7" name="Picture 6" descr="image.png"/>
-          <p:cNvPicPr>
-            <a:picLocks noChangeAspect="1"/>
-          </p:cNvPicPr>
-          <p:nvPr/>
-        </p:nvPicPr>
-        <p:blipFill>
-          <a:blip r:embed="rId2"/>
-          <a:stretch>
-            <a:fillRect/>
-          </a:stretch>
-        </p:blipFill>
-        <p:spPr>
-          <a:xfrm>
-            <a:off x="12700" y="1079500"/>
-            <a:ext cx="4546600" cy="3429000"/>
-          </a:xfrm>
-          <a:prstGeom prst="rect">
-            <a:avLst/>
-          </a:prstGeom>
-        </p:spPr>
-      </p:pic>
-      <p:pic>
-        <p:nvPicPr>
-          <p:cNvPr id="8" name="Picture 7" descr="image.png"/>
-          <p:cNvPicPr>
-            <a:picLocks noChangeAspect="1"/>
-          </p:cNvPicPr>
-          <p:nvPr/>
-        </p:nvPicPr>
-        <p:blipFill>
-          <a:blip r:embed="rId3"/>
-          <a:stretch>
-            <a:fillRect/>
-          </a:stretch>
-        </p:blipFill>
-        <p:spPr>
-          <a:xfrm>
-            <a:off x="4572000" y="1079500"/>
-            <a:ext cx="4546600" cy="3429000"/>
-          </a:xfrm>
-          <a:prstGeom prst="rect">
-            <a:avLst/>
-          </a:prstGeom>
-        </p:spPr>
-      </p:pic>
-      <p:pic>
-        <p:nvPicPr>
-          <p:cNvPr id="9" name="Picture 8" descr="image.png"/>
-          <p:cNvPicPr>
-            <a:picLocks noChangeAspect="1"/>
-          </p:cNvPicPr>
-          <p:nvPr/>
-        </p:nvPicPr>
-        <p:blipFill>
-          <a:blip r:embed="rId2"/>
-          <a:stretch>
-            <a:fillRect/>
-          </a:stretch>
-        </p:blipFill>
-        <p:spPr>
-          <a:xfrm>
-            <a:off x="12700" y="1079500"/>
-            <a:ext cx="4546600" cy="3429000"/>
-          </a:xfrm>
-          <a:prstGeom prst="rect">
-            <a:avLst/>
-          </a:prstGeom>
-        </p:spPr>
-      </p:pic>
-      <p:pic>
-        <p:nvPicPr>
-          <p:cNvPr id="10" name="Picture 9" descr="image.png"/>
-          <p:cNvPicPr>
-            <a:picLocks noChangeAspect="1"/>
-          </p:cNvPicPr>
-          <p:nvPr/>
-        </p:nvPicPr>
-        <p:blipFill>
-          <a:blip r:embed="rId3"/>
-          <a:stretch>
-            <a:fillRect/>
-          </a:stretch>
-        </p:blipFill>
-        <p:spPr>
-          <a:xfrm>
-            <a:off x="4572000" y="1079500"/>
-            <a:ext cx="4546600" cy="3429000"/>
-          </a:xfrm>
-          <a:prstGeom prst="rect">
-            <a:avLst/>
-          </a:prstGeom>
-        </p:spPr>
-      </p:pic>
-      <p:pic>
-        <p:nvPicPr>
-          <p:cNvPr id="11" name="Picture 10" descr="image.png"/>
-          <p:cNvPicPr>
-            <a:picLocks noChangeAspect="1"/>
-          </p:cNvPicPr>
-          <p:nvPr/>
-        </p:nvPicPr>
-        <p:blipFill>
-          <a:blip r:embed="rId2"/>
-          <a:stretch>
-            <a:fillRect/>
-          </a:stretch>
-        </p:blipFill>
-        <p:spPr>
-          <a:xfrm>
-            <a:off x="12700" y="1079500"/>
-            <a:ext cx="4546600" cy="3429000"/>
-          </a:xfrm>
-          <a:prstGeom prst="rect">
-            <a:avLst/>
-          </a:prstGeom>
-        </p:spPr>
-      </p:pic>
-      <p:pic>
-        <p:nvPicPr>
-          <p:cNvPr id="12" name="Picture 11" descr="image.png"/>
-          <p:cNvPicPr>
-            <a:picLocks noChangeAspect="1"/>
-          </p:cNvPicPr>
-          <p:nvPr/>
-        </p:nvPicPr>
-        <p:blipFill>
-          <a:blip r:embed="rId3"/>
-          <a:stretch>
-            <a:fillRect/>
-          </a:stretch>
-        </p:blipFill>
-        <p:spPr>
-          <a:xfrm>
-            <a:off x="4572000" y="1079500"/>
-            <a:ext cx="4546600" cy="3429000"/>
-          </a:xfrm>
-          <a:prstGeom prst="rect">
-            <a:avLst/>
-          </a:prstGeom>
-        </p:spPr>
-      </p:pic>
-      <p:pic>
-        <p:nvPicPr>
-          <p:cNvPr id="13" name="Picture 12" descr="image.png"/>
-          <p:cNvPicPr>
-            <a:picLocks noChangeAspect="1"/>
-          </p:cNvPicPr>
-          <p:nvPr/>
-        </p:nvPicPr>
-        <p:blipFill>
-          <a:blip r:embed="rId2"/>
-          <a:stretch>
-            <a:fillRect/>
-          </a:stretch>
-        </p:blipFill>
-        <p:spPr>
-          <a:xfrm>
-            <a:off x="12700" y="1079500"/>
-            <a:ext cx="4546600" cy="3429000"/>
-          </a:xfrm>
-          <a:prstGeom prst="rect">
-            <a:avLst/>
-          </a:prstGeom>
-        </p:spPr>
-      </p:pic>
-      <p:pic>
-        <p:nvPicPr>
-          <p:cNvPr id="14" name="Picture 13" descr="image.png"/>
-          <p:cNvPicPr>
-            <a:picLocks noChangeAspect="1"/>
-          </p:cNvPicPr>
-          <p:nvPr/>
-        </p:nvPicPr>
-        <p:blipFill>
-          <a:blip r:embed="rId3"/>
-          <a:stretch>
-            <a:fillRect/>
-          </a:stretch>
-        </p:blipFill>
-        <p:spPr>
-          <a:xfrm>
-            <a:off x="4572000" y="1079500"/>
-            <a:ext cx="4546600" cy="3429000"/>
-          </a:xfrm>
-          <a:prstGeom prst="rect">
-            <a:avLst/>
-          </a:prstGeom>
-        </p:spPr>
-      </p:pic>
-      <p:pic>
-        <p:nvPicPr>
-          <p:cNvPr id="15" name="Picture 14" descr="image.png"/>
-          <p:cNvPicPr>
-            <a:picLocks noChangeAspect="1"/>
-          </p:cNvPicPr>
-          <p:nvPr/>
-        </p:nvPicPr>
-        <p:blipFill>
-          <a:blip r:embed="rId2"/>
-          <a:stretch>
-            <a:fillRect/>
-          </a:stretch>
-        </p:blipFill>
-        <p:spPr>
-          <a:xfrm>
-            <a:off x="12700" y="1079500"/>
-            <a:ext cx="4546600" cy="3429000"/>
-          </a:xfrm>
-          <a:prstGeom prst="rect">
-            <a:avLst/>
-          </a:prstGeom>
-        </p:spPr>
-      </p:pic>
-      <p:pic>
-        <p:nvPicPr>
-          <p:cNvPr id="16" name="Picture 15" descr="image.png"/>
-          <p:cNvPicPr>
-            <a:picLocks noChangeAspect="1"/>
-          </p:cNvPicPr>
-          <p:nvPr/>
-        </p:nvPicPr>
-        <p:blipFill>
-          <a:blip r:embed="rId3"/>
-          <a:stretch>
-            <a:fillRect/>
-          </a:stretch>
-        </p:blipFill>
-        <p:spPr>
-          <a:xfrm>
-            <a:off x="4572000" y="1079500"/>
-            <a:ext cx="4546600" cy="3429000"/>
-          </a:xfrm>
-          <a:prstGeom prst="rect">
-            <a:avLst/>
-          </a:prstGeom>
-        </p:spPr>
-      </p:pic>
-      <p:pic>
-        <p:nvPicPr>
-          <p:cNvPr id="17" name="Picture 16" descr="image.png"/>
-          <p:cNvPicPr>
-            <a:picLocks noChangeAspect="1"/>
-          </p:cNvPicPr>
-          <p:nvPr/>
-        </p:nvPicPr>
-        <p:blipFill>
-          <a:blip r:embed="rId2"/>
-          <a:stretch>
-            <a:fillRect/>
-          </a:stretch>
-        </p:blipFill>
-        <p:spPr>
-          <a:xfrm>
-            <a:off x="12700" y="1079500"/>
-            <a:ext cx="4546600" cy="3429000"/>
-          </a:xfrm>
-          <a:prstGeom prst="rect">
-            <a:avLst/>
-          </a:prstGeom>
-        </p:spPr>
-      </p:pic>
-      <p:pic>
-        <p:nvPicPr>
-          <p:cNvPr id="18" name="Picture 17" descr="image.png"/>
           <p:cNvPicPr>
             <a:picLocks noChangeAspect="1"/>
           </p:cNvPicPr>
@@ -9399,7 +8535,7 @@
           <a:p>
             <a:r>
               <a:rPr lang="en-US" dirty="0"/>
-              <a:t>5537_-_State_7_-_RRBB | VT-01 Off-Board Emissions (3m)</a:t>
+              <a:t>5537_-_State_5_-_RLBB | VT-01 Off-Board Emissions (3m)</a:t>
             </a:r>
           </a:p>
         </p:txBody>
@@ -9468,294 +8604,6 @@
       <p:pic>
         <p:nvPicPr>
           <p:cNvPr id="6" name="Picture 5" descr="image.png"/>
-          <p:cNvPicPr>
-            <a:picLocks noChangeAspect="1"/>
-          </p:cNvPicPr>
-          <p:nvPr/>
-        </p:nvPicPr>
-        <p:blipFill>
-          <a:blip r:embed="rId3"/>
-          <a:stretch>
-            <a:fillRect/>
-          </a:stretch>
-        </p:blipFill>
-        <p:spPr>
-          <a:xfrm>
-            <a:off x="4572000" y="1079500"/>
-            <a:ext cx="4546600" cy="3429000"/>
-          </a:xfrm>
-          <a:prstGeom prst="rect">
-            <a:avLst/>
-          </a:prstGeom>
-        </p:spPr>
-      </p:pic>
-      <p:pic>
-        <p:nvPicPr>
-          <p:cNvPr id="7" name="Picture 6" descr="image.png"/>
-          <p:cNvPicPr>
-            <a:picLocks noChangeAspect="1"/>
-          </p:cNvPicPr>
-          <p:nvPr/>
-        </p:nvPicPr>
-        <p:blipFill>
-          <a:blip r:embed="rId2"/>
-          <a:stretch>
-            <a:fillRect/>
-          </a:stretch>
-        </p:blipFill>
-        <p:spPr>
-          <a:xfrm>
-            <a:off x="12700" y="1079500"/>
-            <a:ext cx="4546600" cy="3429000"/>
-          </a:xfrm>
-          <a:prstGeom prst="rect">
-            <a:avLst/>
-          </a:prstGeom>
-        </p:spPr>
-      </p:pic>
-      <p:pic>
-        <p:nvPicPr>
-          <p:cNvPr id="8" name="Picture 7" descr="image.png"/>
-          <p:cNvPicPr>
-            <a:picLocks noChangeAspect="1"/>
-          </p:cNvPicPr>
-          <p:nvPr/>
-        </p:nvPicPr>
-        <p:blipFill>
-          <a:blip r:embed="rId3"/>
-          <a:stretch>
-            <a:fillRect/>
-          </a:stretch>
-        </p:blipFill>
-        <p:spPr>
-          <a:xfrm>
-            <a:off x="4572000" y="1079500"/>
-            <a:ext cx="4546600" cy="3429000"/>
-          </a:xfrm>
-          <a:prstGeom prst="rect">
-            <a:avLst/>
-          </a:prstGeom>
-        </p:spPr>
-      </p:pic>
-      <p:pic>
-        <p:nvPicPr>
-          <p:cNvPr id="9" name="Picture 8" descr="image.png"/>
-          <p:cNvPicPr>
-            <a:picLocks noChangeAspect="1"/>
-          </p:cNvPicPr>
-          <p:nvPr/>
-        </p:nvPicPr>
-        <p:blipFill>
-          <a:blip r:embed="rId2"/>
-          <a:stretch>
-            <a:fillRect/>
-          </a:stretch>
-        </p:blipFill>
-        <p:spPr>
-          <a:xfrm>
-            <a:off x="12700" y="1079500"/>
-            <a:ext cx="4546600" cy="3429000"/>
-          </a:xfrm>
-          <a:prstGeom prst="rect">
-            <a:avLst/>
-          </a:prstGeom>
-        </p:spPr>
-      </p:pic>
-      <p:pic>
-        <p:nvPicPr>
-          <p:cNvPr id="10" name="Picture 9" descr="image.png"/>
-          <p:cNvPicPr>
-            <a:picLocks noChangeAspect="1"/>
-          </p:cNvPicPr>
-          <p:nvPr/>
-        </p:nvPicPr>
-        <p:blipFill>
-          <a:blip r:embed="rId3"/>
-          <a:stretch>
-            <a:fillRect/>
-          </a:stretch>
-        </p:blipFill>
-        <p:spPr>
-          <a:xfrm>
-            <a:off x="4572000" y="1079500"/>
-            <a:ext cx="4546600" cy="3429000"/>
-          </a:xfrm>
-          <a:prstGeom prst="rect">
-            <a:avLst/>
-          </a:prstGeom>
-        </p:spPr>
-      </p:pic>
-      <p:pic>
-        <p:nvPicPr>
-          <p:cNvPr id="11" name="Picture 10" descr="image.png"/>
-          <p:cNvPicPr>
-            <a:picLocks noChangeAspect="1"/>
-          </p:cNvPicPr>
-          <p:nvPr/>
-        </p:nvPicPr>
-        <p:blipFill>
-          <a:blip r:embed="rId2"/>
-          <a:stretch>
-            <a:fillRect/>
-          </a:stretch>
-        </p:blipFill>
-        <p:spPr>
-          <a:xfrm>
-            <a:off x="12700" y="1079500"/>
-            <a:ext cx="4546600" cy="3429000"/>
-          </a:xfrm>
-          <a:prstGeom prst="rect">
-            <a:avLst/>
-          </a:prstGeom>
-        </p:spPr>
-      </p:pic>
-      <p:pic>
-        <p:nvPicPr>
-          <p:cNvPr id="12" name="Picture 11" descr="image.png"/>
-          <p:cNvPicPr>
-            <a:picLocks noChangeAspect="1"/>
-          </p:cNvPicPr>
-          <p:nvPr/>
-        </p:nvPicPr>
-        <p:blipFill>
-          <a:blip r:embed="rId3"/>
-          <a:stretch>
-            <a:fillRect/>
-          </a:stretch>
-        </p:blipFill>
-        <p:spPr>
-          <a:xfrm>
-            <a:off x="4572000" y="1079500"/>
-            <a:ext cx="4546600" cy="3429000"/>
-          </a:xfrm>
-          <a:prstGeom prst="rect">
-            <a:avLst/>
-          </a:prstGeom>
-        </p:spPr>
-      </p:pic>
-      <p:pic>
-        <p:nvPicPr>
-          <p:cNvPr id="13" name="Picture 12" descr="image.png"/>
-          <p:cNvPicPr>
-            <a:picLocks noChangeAspect="1"/>
-          </p:cNvPicPr>
-          <p:nvPr/>
-        </p:nvPicPr>
-        <p:blipFill>
-          <a:blip r:embed="rId2"/>
-          <a:stretch>
-            <a:fillRect/>
-          </a:stretch>
-        </p:blipFill>
-        <p:spPr>
-          <a:xfrm>
-            <a:off x="12700" y="1079500"/>
-            <a:ext cx="4546600" cy="3429000"/>
-          </a:xfrm>
-          <a:prstGeom prst="rect">
-            <a:avLst/>
-          </a:prstGeom>
-        </p:spPr>
-      </p:pic>
-      <p:pic>
-        <p:nvPicPr>
-          <p:cNvPr id="14" name="Picture 13" descr="image.png"/>
-          <p:cNvPicPr>
-            <a:picLocks noChangeAspect="1"/>
-          </p:cNvPicPr>
-          <p:nvPr/>
-        </p:nvPicPr>
-        <p:blipFill>
-          <a:blip r:embed="rId3"/>
-          <a:stretch>
-            <a:fillRect/>
-          </a:stretch>
-        </p:blipFill>
-        <p:spPr>
-          <a:xfrm>
-            <a:off x="4572000" y="1079500"/>
-            <a:ext cx="4546600" cy="3429000"/>
-          </a:xfrm>
-          <a:prstGeom prst="rect">
-            <a:avLst/>
-          </a:prstGeom>
-        </p:spPr>
-      </p:pic>
-      <p:pic>
-        <p:nvPicPr>
-          <p:cNvPr id="15" name="Picture 14" descr="image.png"/>
-          <p:cNvPicPr>
-            <a:picLocks noChangeAspect="1"/>
-          </p:cNvPicPr>
-          <p:nvPr/>
-        </p:nvPicPr>
-        <p:blipFill>
-          <a:blip r:embed="rId2"/>
-          <a:stretch>
-            <a:fillRect/>
-          </a:stretch>
-        </p:blipFill>
-        <p:spPr>
-          <a:xfrm>
-            <a:off x="12700" y="1079500"/>
-            <a:ext cx="4546600" cy="3429000"/>
-          </a:xfrm>
-          <a:prstGeom prst="rect">
-            <a:avLst/>
-          </a:prstGeom>
-        </p:spPr>
-      </p:pic>
-      <p:pic>
-        <p:nvPicPr>
-          <p:cNvPr id="16" name="Picture 15" descr="image.png"/>
-          <p:cNvPicPr>
-            <a:picLocks noChangeAspect="1"/>
-          </p:cNvPicPr>
-          <p:nvPr/>
-        </p:nvPicPr>
-        <p:blipFill>
-          <a:blip r:embed="rId3"/>
-          <a:stretch>
-            <a:fillRect/>
-          </a:stretch>
-        </p:blipFill>
-        <p:spPr>
-          <a:xfrm>
-            <a:off x="4572000" y="1079500"/>
-            <a:ext cx="4546600" cy="3429000"/>
-          </a:xfrm>
-          <a:prstGeom prst="rect">
-            <a:avLst/>
-          </a:prstGeom>
-        </p:spPr>
-      </p:pic>
-      <p:pic>
-        <p:nvPicPr>
-          <p:cNvPr id="17" name="Picture 16" descr="image.png"/>
-          <p:cNvPicPr>
-            <a:picLocks noChangeAspect="1"/>
-          </p:cNvPicPr>
-          <p:nvPr/>
-        </p:nvPicPr>
-        <p:blipFill>
-          <a:blip r:embed="rId2"/>
-          <a:stretch>
-            <a:fillRect/>
-          </a:stretch>
-        </p:blipFill>
-        <p:spPr>
-          <a:xfrm>
-            <a:off x="12700" y="1079500"/>
-            <a:ext cx="4546600" cy="3429000"/>
-          </a:xfrm>
-          <a:prstGeom prst="rect">
-            <a:avLst/>
-          </a:prstGeom>
-        </p:spPr>
-      </p:pic>
-      <p:pic>
-        <p:nvPicPr>
-          <p:cNvPr id="18" name="Picture 17" descr="image.png"/>
           <p:cNvPicPr>
             <a:picLocks noChangeAspect="1"/>
           </p:cNvPicPr>
@@ -11154,7 +10002,7 @@
           <a:p>
             <a:r>
               <a:rPr lang="en-US" dirty="0"/>
-              <a:t>5537_-_State_28_-_CE | VT-12 Conducted Emissions (Single Phase)</a:t>
+              <a:t>5537_-_State_6_-_FLBB - Copy | VT-01 Off-Board Emissions (3m)</a:t>
             </a:r>
           </a:p>
         </p:txBody>
@@ -11223,294 +10071,6 @@
       <p:pic>
         <p:nvPicPr>
           <p:cNvPr id="6" name="Picture 5" descr="image.png"/>
-          <p:cNvPicPr>
-            <a:picLocks noChangeAspect="1"/>
-          </p:cNvPicPr>
-          <p:nvPr/>
-        </p:nvPicPr>
-        <p:blipFill>
-          <a:blip r:embed="rId3"/>
-          <a:stretch>
-            <a:fillRect/>
-          </a:stretch>
-        </p:blipFill>
-        <p:spPr>
-          <a:xfrm>
-            <a:off x="4572000" y="1079500"/>
-            <a:ext cx="4546600" cy="3429000"/>
-          </a:xfrm>
-          <a:prstGeom prst="rect">
-            <a:avLst/>
-          </a:prstGeom>
-        </p:spPr>
-      </p:pic>
-      <p:pic>
-        <p:nvPicPr>
-          <p:cNvPr id="7" name="Picture 6" descr="image.png"/>
-          <p:cNvPicPr>
-            <a:picLocks noChangeAspect="1"/>
-          </p:cNvPicPr>
-          <p:nvPr/>
-        </p:nvPicPr>
-        <p:blipFill>
-          <a:blip r:embed="rId2"/>
-          <a:stretch>
-            <a:fillRect/>
-          </a:stretch>
-        </p:blipFill>
-        <p:spPr>
-          <a:xfrm>
-            <a:off x="12700" y="1079500"/>
-            <a:ext cx="4546600" cy="3429000"/>
-          </a:xfrm>
-          <a:prstGeom prst="rect">
-            <a:avLst/>
-          </a:prstGeom>
-        </p:spPr>
-      </p:pic>
-      <p:pic>
-        <p:nvPicPr>
-          <p:cNvPr id="8" name="Picture 7" descr="image.png"/>
-          <p:cNvPicPr>
-            <a:picLocks noChangeAspect="1"/>
-          </p:cNvPicPr>
-          <p:nvPr/>
-        </p:nvPicPr>
-        <p:blipFill>
-          <a:blip r:embed="rId3"/>
-          <a:stretch>
-            <a:fillRect/>
-          </a:stretch>
-        </p:blipFill>
-        <p:spPr>
-          <a:xfrm>
-            <a:off x="4572000" y="1079500"/>
-            <a:ext cx="4546600" cy="3429000"/>
-          </a:xfrm>
-          <a:prstGeom prst="rect">
-            <a:avLst/>
-          </a:prstGeom>
-        </p:spPr>
-      </p:pic>
-      <p:pic>
-        <p:nvPicPr>
-          <p:cNvPr id="9" name="Picture 8" descr="image.png"/>
-          <p:cNvPicPr>
-            <a:picLocks noChangeAspect="1"/>
-          </p:cNvPicPr>
-          <p:nvPr/>
-        </p:nvPicPr>
-        <p:blipFill>
-          <a:blip r:embed="rId2"/>
-          <a:stretch>
-            <a:fillRect/>
-          </a:stretch>
-        </p:blipFill>
-        <p:spPr>
-          <a:xfrm>
-            <a:off x="12700" y="1079500"/>
-            <a:ext cx="4546600" cy="3429000"/>
-          </a:xfrm>
-          <a:prstGeom prst="rect">
-            <a:avLst/>
-          </a:prstGeom>
-        </p:spPr>
-      </p:pic>
-      <p:pic>
-        <p:nvPicPr>
-          <p:cNvPr id="10" name="Picture 9" descr="image.png"/>
-          <p:cNvPicPr>
-            <a:picLocks noChangeAspect="1"/>
-          </p:cNvPicPr>
-          <p:nvPr/>
-        </p:nvPicPr>
-        <p:blipFill>
-          <a:blip r:embed="rId3"/>
-          <a:stretch>
-            <a:fillRect/>
-          </a:stretch>
-        </p:blipFill>
-        <p:spPr>
-          <a:xfrm>
-            <a:off x="4572000" y="1079500"/>
-            <a:ext cx="4546600" cy="3429000"/>
-          </a:xfrm>
-          <a:prstGeom prst="rect">
-            <a:avLst/>
-          </a:prstGeom>
-        </p:spPr>
-      </p:pic>
-      <p:pic>
-        <p:nvPicPr>
-          <p:cNvPr id="11" name="Picture 10" descr="image.png"/>
-          <p:cNvPicPr>
-            <a:picLocks noChangeAspect="1"/>
-          </p:cNvPicPr>
-          <p:nvPr/>
-        </p:nvPicPr>
-        <p:blipFill>
-          <a:blip r:embed="rId2"/>
-          <a:stretch>
-            <a:fillRect/>
-          </a:stretch>
-        </p:blipFill>
-        <p:spPr>
-          <a:xfrm>
-            <a:off x="12700" y="1079500"/>
-            <a:ext cx="4546600" cy="3429000"/>
-          </a:xfrm>
-          <a:prstGeom prst="rect">
-            <a:avLst/>
-          </a:prstGeom>
-        </p:spPr>
-      </p:pic>
-      <p:pic>
-        <p:nvPicPr>
-          <p:cNvPr id="12" name="Picture 11" descr="image.png"/>
-          <p:cNvPicPr>
-            <a:picLocks noChangeAspect="1"/>
-          </p:cNvPicPr>
-          <p:nvPr/>
-        </p:nvPicPr>
-        <p:blipFill>
-          <a:blip r:embed="rId3"/>
-          <a:stretch>
-            <a:fillRect/>
-          </a:stretch>
-        </p:blipFill>
-        <p:spPr>
-          <a:xfrm>
-            <a:off x="4572000" y="1079500"/>
-            <a:ext cx="4546600" cy="3429000"/>
-          </a:xfrm>
-          <a:prstGeom prst="rect">
-            <a:avLst/>
-          </a:prstGeom>
-        </p:spPr>
-      </p:pic>
-      <p:pic>
-        <p:nvPicPr>
-          <p:cNvPr id="13" name="Picture 12" descr="image.png"/>
-          <p:cNvPicPr>
-            <a:picLocks noChangeAspect="1"/>
-          </p:cNvPicPr>
-          <p:nvPr/>
-        </p:nvPicPr>
-        <p:blipFill>
-          <a:blip r:embed="rId2"/>
-          <a:stretch>
-            <a:fillRect/>
-          </a:stretch>
-        </p:blipFill>
-        <p:spPr>
-          <a:xfrm>
-            <a:off x="12700" y="1079500"/>
-            <a:ext cx="4546600" cy="3429000"/>
-          </a:xfrm>
-          <a:prstGeom prst="rect">
-            <a:avLst/>
-          </a:prstGeom>
-        </p:spPr>
-      </p:pic>
-      <p:pic>
-        <p:nvPicPr>
-          <p:cNvPr id="14" name="Picture 13" descr="image.png"/>
-          <p:cNvPicPr>
-            <a:picLocks noChangeAspect="1"/>
-          </p:cNvPicPr>
-          <p:nvPr/>
-        </p:nvPicPr>
-        <p:blipFill>
-          <a:blip r:embed="rId3"/>
-          <a:stretch>
-            <a:fillRect/>
-          </a:stretch>
-        </p:blipFill>
-        <p:spPr>
-          <a:xfrm>
-            <a:off x="4572000" y="1079500"/>
-            <a:ext cx="4546600" cy="3429000"/>
-          </a:xfrm>
-          <a:prstGeom prst="rect">
-            <a:avLst/>
-          </a:prstGeom>
-        </p:spPr>
-      </p:pic>
-      <p:pic>
-        <p:nvPicPr>
-          <p:cNvPr id="15" name="Picture 14" descr="image.png"/>
-          <p:cNvPicPr>
-            <a:picLocks noChangeAspect="1"/>
-          </p:cNvPicPr>
-          <p:nvPr/>
-        </p:nvPicPr>
-        <p:blipFill>
-          <a:blip r:embed="rId2"/>
-          <a:stretch>
-            <a:fillRect/>
-          </a:stretch>
-        </p:blipFill>
-        <p:spPr>
-          <a:xfrm>
-            <a:off x="12700" y="1079500"/>
-            <a:ext cx="4546600" cy="3429000"/>
-          </a:xfrm>
-          <a:prstGeom prst="rect">
-            <a:avLst/>
-          </a:prstGeom>
-        </p:spPr>
-      </p:pic>
-      <p:pic>
-        <p:nvPicPr>
-          <p:cNvPr id="16" name="Picture 15" descr="image.png"/>
-          <p:cNvPicPr>
-            <a:picLocks noChangeAspect="1"/>
-          </p:cNvPicPr>
-          <p:nvPr/>
-        </p:nvPicPr>
-        <p:blipFill>
-          <a:blip r:embed="rId3"/>
-          <a:stretch>
-            <a:fillRect/>
-          </a:stretch>
-        </p:blipFill>
-        <p:spPr>
-          <a:xfrm>
-            <a:off x="4572000" y="1079500"/>
-            <a:ext cx="4546600" cy="3429000"/>
-          </a:xfrm>
-          <a:prstGeom prst="rect">
-            <a:avLst/>
-          </a:prstGeom>
-        </p:spPr>
-      </p:pic>
-      <p:pic>
-        <p:nvPicPr>
-          <p:cNvPr id="17" name="Picture 16" descr="image.png"/>
-          <p:cNvPicPr>
-            <a:picLocks noChangeAspect="1"/>
-          </p:cNvPicPr>
-          <p:nvPr/>
-        </p:nvPicPr>
-        <p:blipFill>
-          <a:blip r:embed="rId2"/>
-          <a:stretch>
-            <a:fillRect/>
-          </a:stretch>
-        </p:blipFill>
-        <p:spPr>
-          <a:xfrm>
-            <a:off x="12700" y="1079500"/>
-            <a:ext cx="4546600" cy="3429000"/>
-          </a:xfrm>
-          <a:prstGeom prst="rect">
-            <a:avLst/>
-          </a:prstGeom>
-        </p:spPr>
-      </p:pic>
-      <p:pic>
-        <p:nvPicPr>
-          <p:cNvPr id="18" name="Picture 17" descr="image.png"/>
           <p:cNvPicPr>
             <a:picLocks noChangeAspect="1"/>
           </p:cNvPicPr>
@@ -11837,7 +10397,7 @@
           <a:p>
             <a:r>
               <a:rPr lang="en-US" dirty="0"/>
-              <a:t>5537_-_State_29_-_CE | VT-12 Conducted Emissions (Single Phase)</a:t>
+              <a:t>5537_-_State_6_-_FLBB | VT-01 Off-Board Emissions (3m)</a:t>
             </a:r>
           </a:p>
         </p:txBody>
@@ -11906,294 +10466,6 @@
       <p:pic>
         <p:nvPicPr>
           <p:cNvPr id="6" name="Picture 5" descr="image.png"/>
-          <p:cNvPicPr>
-            <a:picLocks noChangeAspect="1"/>
-          </p:cNvPicPr>
-          <p:nvPr/>
-        </p:nvPicPr>
-        <p:blipFill>
-          <a:blip r:embed="rId3"/>
-          <a:stretch>
-            <a:fillRect/>
-          </a:stretch>
-        </p:blipFill>
-        <p:spPr>
-          <a:xfrm>
-            <a:off x="4572000" y="1079500"/>
-            <a:ext cx="4546600" cy="3429000"/>
-          </a:xfrm>
-          <a:prstGeom prst="rect">
-            <a:avLst/>
-          </a:prstGeom>
-        </p:spPr>
-      </p:pic>
-      <p:pic>
-        <p:nvPicPr>
-          <p:cNvPr id="7" name="Picture 6" descr="image.png"/>
-          <p:cNvPicPr>
-            <a:picLocks noChangeAspect="1"/>
-          </p:cNvPicPr>
-          <p:nvPr/>
-        </p:nvPicPr>
-        <p:blipFill>
-          <a:blip r:embed="rId2"/>
-          <a:stretch>
-            <a:fillRect/>
-          </a:stretch>
-        </p:blipFill>
-        <p:spPr>
-          <a:xfrm>
-            <a:off x="12700" y="1079500"/>
-            <a:ext cx="4546600" cy="3429000"/>
-          </a:xfrm>
-          <a:prstGeom prst="rect">
-            <a:avLst/>
-          </a:prstGeom>
-        </p:spPr>
-      </p:pic>
-      <p:pic>
-        <p:nvPicPr>
-          <p:cNvPr id="8" name="Picture 7" descr="image.png"/>
-          <p:cNvPicPr>
-            <a:picLocks noChangeAspect="1"/>
-          </p:cNvPicPr>
-          <p:nvPr/>
-        </p:nvPicPr>
-        <p:blipFill>
-          <a:blip r:embed="rId3"/>
-          <a:stretch>
-            <a:fillRect/>
-          </a:stretch>
-        </p:blipFill>
-        <p:spPr>
-          <a:xfrm>
-            <a:off x="4572000" y="1079500"/>
-            <a:ext cx="4546600" cy="3429000"/>
-          </a:xfrm>
-          <a:prstGeom prst="rect">
-            <a:avLst/>
-          </a:prstGeom>
-        </p:spPr>
-      </p:pic>
-      <p:pic>
-        <p:nvPicPr>
-          <p:cNvPr id="9" name="Picture 8" descr="image.png"/>
-          <p:cNvPicPr>
-            <a:picLocks noChangeAspect="1"/>
-          </p:cNvPicPr>
-          <p:nvPr/>
-        </p:nvPicPr>
-        <p:blipFill>
-          <a:blip r:embed="rId2"/>
-          <a:stretch>
-            <a:fillRect/>
-          </a:stretch>
-        </p:blipFill>
-        <p:spPr>
-          <a:xfrm>
-            <a:off x="12700" y="1079500"/>
-            <a:ext cx="4546600" cy="3429000"/>
-          </a:xfrm>
-          <a:prstGeom prst="rect">
-            <a:avLst/>
-          </a:prstGeom>
-        </p:spPr>
-      </p:pic>
-      <p:pic>
-        <p:nvPicPr>
-          <p:cNvPr id="10" name="Picture 9" descr="image.png"/>
-          <p:cNvPicPr>
-            <a:picLocks noChangeAspect="1"/>
-          </p:cNvPicPr>
-          <p:nvPr/>
-        </p:nvPicPr>
-        <p:blipFill>
-          <a:blip r:embed="rId3"/>
-          <a:stretch>
-            <a:fillRect/>
-          </a:stretch>
-        </p:blipFill>
-        <p:spPr>
-          <a:xfrm>
-            <a:off x="4572000" y="1079500"/>
-            <a:ext cx="4546600" cy="3429000"/>
-          </a:xfrm>
-          <a:prstGeom prst="rect">
-            <a:avLst/>
-          </a:prstGeom>
-        </p:spPr>
-      </p:pic>
-      <p:pic>
-        <p:nvPicPr>
-          <p:cNvPr id="11" name="Picture 10" descr="image.png"/>
-          <p:cNvPicPr>
-            <a:picLocks noChangeAspect="1"/>
-          </p:cNvPicPr>
-          <p:nvPr/>
-        </p:nvPicPr>
-        <p:blipFill>
-          <a:blip r:embed="rId2"/>
-          <a:stretch>
-            <a:fillRect/>
-          </a:stretch>
-        </p:blipFill>
-        <p:spPr>
-          <a:xfrm>
-            <a:off x="12700" y="1079500"/>
-            <a:ext cx="4546600" cy="3429000"/>
-          </a:xfrm>
-          <a:prstGeom prst="rect">
-            <a:avLst/>
-          </a:prstGeom>
-        </p:spPr>
-      </p:pic>
-      <p:pic>
-        <p:nvPicPr>
-          <p:cNvPr id="12" name="Picture 11" descr="image.png"/>
-          <p:cNvPicPr>
-            <a:picLocks noChangeAspect="1"/>
-          </p:cNvPicPr>
-          <p:nvPr/>
-        </p:nvPicPr>
-        <p:blipFill>
-          <a:blip r:embed="rId3"/>
-          <a:stretch>
-            <a:fillRect/>
-          </a:stretch>
-        </p:blipFill>
-        <p:spPr>
-          <a:xfrm>
-            <a:off x="4572000" y="1079500"/>
-            <a:ext cx="4546600" cy="3429000"/>
-          </a:xfrm>
-          <a:prstGeom prst="rect">
-            <a:avLst/>
-          </a:prstGeom>
-        </p:spPr>
-      </p:pic>
-      <p:pic>
-        <p:nvPicPr>
-          <p:cNvPr id="13" name="Picture 12" descr="image.png"/>
-          <p:cNvPicPr>
-            <a:picLocks noChangeAspect="1"/>
-          </p:cNvPicPr>
-          <p:nvPr/>
-        </p:nvPicPr>
-        <p:blipFill>
-          <a:blip r:embed="rId2"/>
-          <a:stretch>
-            <a:fillRect/>
-          </a:stretch>
-        </p:blipFill>
-        <p:spPr>
-          <a:xfrm>
-            <a:off x="12700" y="1079500"/>
-            <a:ext cx="4546600" cy="3429000"/>
-          </a:xfrm>
-          <a:prstGeom prst="rect">
-            <a:avLst/>
-          </a:prstGeom>
-        </p:spPr>
-      </p:pic>
-      <p:pic>
-        <p:nvPicPr>
-          <p:cNvPr id="14" name="Picture 13" descr="image.png"/>
-          <p:cNvPicPr>
-            <a:picLocks noChangeAspect="1"/>
-          </p:cNvPicPr>
-          <p:nvPr/>
-        </p:nvPicPr>
-        <p:blipFill>
-          <a:blip r:embed="rId3"/>
-          <a:stretch>
-            <a:fillRect/>
-          </a:stretch>
-        </p:blipFill>
-        <p:spPr>
-          <a:xfrm>
-            <a:off x="4572000" y="1079500"/>
-            <a:ext cx="4546600" cy="3429000"/>
-          </a:xfrm>
-          <a:prstGeom prst="rect">
-            <a:avLst/>
-          </a:prstGeom>
-        </p:spPr>
-      </p:pic>
-      <p:pic>
-        <p:nvPicPr>
-          <p:cNvPr id="15" name="Picture 14" descr="image.png"/>
-          <p:cNvPicPr>
-            <a:picLocks noChangeAspect="1"/>
-          </p:cNvPicPr>
-          <p:nvPr/>
-        </p:nvPicPr>
-        <p:blipFill>
-          <a:blip r:embed="rId2"/>
-          <a:stretch>
-            <a:fillRect/>
-          </a:stretch>
-        </p:blipFill>
-        <p:spPr>
-          <a:xfrm>
-            <a:off x="12700" y="1079500"/>
-            <a:ext cx="4546600" cy="3429000"/>
-          </a:xfrm>
-          <a:prstGeom prst="rect">
-            <a:avLst/>
-          </a:prstGeom>
-        </p:spPr>
-      </p:pic>
-      <p:pic>
-        <p:nvPicPr>
-          <p:cNvPr id="16" name="Picture 15" descr="image.png"/>
-          <p:cNvPicPr>
-            <a:picLocks noChangeAspect="1"/>
-          </p:cNvPicPr>
-          <p:nvPr/>
-        </p:nvPicPr>
-        <p:blipFill>
-          <a:blip r:embed="rId3"/>
-          <a:stretch>
-            <a:fillRect/>
-          </a:stretch>
-        </p:blipFill>
-        <p:spPr>
-          <a:xfrm>
-            <a:off x="4572000" y="1079500"/>
-            <a:ext cx="4546600" cy="3429000"/>
-          </a:xfrm>
-          <a:prstGeom prst="rect">
-            <a:avLst/>
-          </a:prstGeom>
-        </p:spPr>
-      </p:pic>
-      <p:pic>
-        <p:nvPicPr>
-          <p:cNvPr id="17" name="Picture 16" descr="image.png"/>
-          <p:cNvPicPr>
-            <a:picLocks noChangeAspect="1"/>
-          </p:cNvPicPr>
-          <p:nvPr/>
-        </p:nvPicPr>
-        <p:blipFill>
-          <a:blip r:embed="rId2"/>
-          <a:stretch>
-            <a:fillRect/>
-          </a:stretch>
-        </p:blipFill>
-        <p:spPr>
-          <a:xfrm>
-            <a:off x="12700" y="1079500"/>
-            <a:ext cx="4546600" cy="3429000"/>
-          </a:xfrm>
-          <a:prstGeom prst="rect">
-            <a:avLst/>
-          </a:prstGeom>
-        </p:spPr>
-      </p:pic>
-      <p:pic>
-        <p:nvPicPr>
-          <p:cNvPr id="18" name="Picture 17" descr="image.png"/>
           <p:cNvPicPr>
             <a:picLocks noChangeAspect="1"/>
           </p:cNvPicPr>
@@ -12302,7 +10574,7 @@
           <a:p>
             <a:r>
               <a:rPr lang="en-US" dirty="0"/>
-              <a:t>5537_-_State_35_Rear_E_Field | VT-15 Electric Fields</a:t>
+              <a:t>5537_-_State_7_-_RRBB - Copy | VT-01 Off-Board Emissions (3m)</a:t>
             </a:r>
           </a:p>
         </p:txBody>
@@ -12361,7 +10633,7 @@
         <p:spPr>
           <a:xfrm>
             <a:off x="12700" y="1079500"/>
-            <a:ext cx="2959100" cy="2235200"/>
+            <a:ext cx="4546600" cy="3429000"/>
           </a:xfrm>
           <a:prstGeom prst="rect">
             <a:avLst/>
@@ -12384,464 +10656,8 @@
         </p:blipFill>
         <p:spPr>
           <a:xfrm>
-            <a:off x="3035300" y="1079500"/>
-            <a:ext cx="2959100" cy="2235200"/>
-          </a:xfrm>
-          <a:prstGeom prst="rect">
-            <a:avLst/>
-          </a:prstGeom>
-        </p:spPr>
-      </p:pic>
-      <p:pic>
-        <p:nvPicPr>
-          <p:cNvPr id="7" name="Picture 6" descr="image.png"/>
-          <p:cNvPicPr>
-            <a:picLocks noChangeAspect="1"/>
-          </p:cNvPicPr>
-          <p:nvPr/>
-        </p:nvPicPr>
-        <p:blipFill>
-          <a:blip r:embed="rId4"/>
-          <a:stretch>
-            <a:fillRect/>
-          </a:stretch>
-        </p:blipFill>
-        <p:spPr>
-          <a:xfrm>
-            <a:off x="6057900" y="1079500"/>
-            <a:ext cx="2959100" cy="2235200"/>
-          </a:xfrm>
-          <a:prstGeom prst="rect">
-            <a:avLst/>
-          </a:prstGeom>
-        </p:spPr>
-      </p:pic>
-      <p:pic>
-        <p:nvPicPr>
-          <p:cNvPr id="8" name="Picture 7" descr="image.png"/>
-          <p:cNvPicPr>
-            <a:picLocks noChangeAspect="1"/>
-          </p:cNvPicPr>
-          <p:nvPr/>
-        </p:nvPicPr>
-        <p:blipFill>
-          <a:blip r:embed="rId2"/>
-          <a:stretch>
-            <a:fillRect/>
-          </a:stretch>
-        </p:blipFill>
-        <p:spPr>
-          <a:xfrm>
-            <a:off x="12700" y="1079500"/>
-            <a:ext cx="2959100" cy="2235200"/>
-          </a:xfrm>
-          <a:prstGeom prst="rect">
-            <a:avLst/>
-          </a:prstGeom>
-        </p:spPr>
-      </p:pic>
-      <p:pic>
-        <p:nvPicPr>
-          <p:cNvPr id="9" name="Picture 8" descr="image.png"/>
-          <p:cNvPicPr>
-            <a:picLocks noChangeAspect="1"/>
-          </p:cNvPicPr>
-          <p:nvPr/>
-        </p:nvPicPr>
-        <p:blipFill>
-          <a:blip r:embed="rId3"/>
-          <a:stretch>
-            <a:fillRect/>
-          </a:stretch>
-        </p:blipFill>
-        <p:spPr>
-          <a:xfrm>
-            <a:off x="3035300" y="1079500"/>
-            <a:ext cx="2959100" cy="2235200"/>
-          </a:xfrm>
-          <a:prstGeom prst="rect">
-            <a:avLst/>
-          </a:prstGeom>
-        </p:spPr>
-      </p:pic>
-      <p:pic>
-        <p:nvPicPr>
-          <p:cNvPr id="10" name="Picture 9" descr="image.png"/>
-          <p:cNvPicPr>
-            <a:picLocks noChangeAspect="1"/>
-          </p:cNvPicPr>
-          <p:nvPr/>
-        </p:nvPicPr>
-        <p:blipFill>
-          <a:blip r:embed="rId4"/>
-          <a:stretch>
-            <a:fillRect/>
-          </a:stretch>
-        </p:blipFill>
-        <p:spPr>
-          <a:xfrm>
-            <a:off x="6057900" y="1079500"/>
-            <a:ext cx="2959100" cy="2235200"/>
-          </a:xfrm>
-          <a:prstGeom prst="rect">
-            <a:avLst/>
-          </a:prstGeom>
-        </p:spPr>
-      </p:pic>
-      <p:pic>
-        <p:nvPicPr>
-          <p:cNvPr id="11" name="Picture 10" descr="image.png"/>
-          <p:cNvPicPr>
-            <a:picLocks noChangeAspect="1"/>
-          </p:cNvPicPr>
-          <p:nvPr/>
-        </p:nvPicPr>
-        <p:blipFill>
-          <a:blip r:embed="rId2"/>
-          <a:stretch>
-            <a:fillRect/>
-          </a:stretch>
-        </p:blipFill>
-        <p:spPr>
-          <a:xfrm>
-            <a:off x="12700" y="1079500"/>
-            <a:ext cx="2959100" cy="2235200"/>
-          </a:xfrm>
-          <a:prstGeom prst="rect">
-            <a:avLst/>
-          </a:prstGeom>
-        </p:spPr>
-      </p:pic>
-      <p:pic>
-        <p:nvPicPr>
-          <p:cNvPr id="12" name="Picture 11" descr="image.png"/>
-          <p:cNvPicPr>
-            <a:picLocks noChangeAspect="1"/>
-          </p:cNvPicPr>
-          <p:nvPr/>
-        </p:nvPicPr>
-        <p:blipFill>
-          <a:blip r:embed="rId3"/>
-          <a:stretch>
-            <a:fillRect/>
-          </a:stretch>
-        </p:blipFill>
-        <p:spPr>
-          <a:xfrm>
-            <a:off x="3035300" y="1079500"/>
-            <a:ext cx="2959100" cy="2235200"/>
-          </a:xfrm>
-          <a:prstGeom prst="rect">
-            <a:avLst/>
-          </a:prstGeom>
-        </p:spPr>
-      </p:pic>
-      <p:pic>
-        <p:nvPicPr>
-          <p:cNvPr id="13" name="Picture 12" descr="image.png"/>
-          <p:cNvPicPr>
-            <a:picLocks noChangeAspect="1"/>
-          </p:cNvPicPr>
-          <p:nvPr/>
-        </p:nvPicPr>
-        <p:blipFill>
-          <a:blip r:embed="rId4"/>
-          <a:stretch>
-            <a:fillRect/>
-          </a:stretch>
-        </p:blipFill>
-        <p:spPr>
-          <a:xfrm>
-            <a:off x="6057900" y="1079500"/>
-            <a:ext cx="2959100" cy="2235200"/>
-          </a:xfrm>
-          <a:prstGeom prst="rect">
-            <a:avLst/>
-          </a:prstGeom>
-        </p:spPr>
-      </p:pic>
-      <p:pic>
-        <p:nvPicPr>
-          <p:cNvPr id="14" name="Picture 13" descr="image.png"/>
-          <p:cNvPicPr>
-            <a:picLocks noChangeAspect="1"/>
-          </p:cNvPicPr>
-          <p:nvPr/>
-        </p:nvPicPr>
-        <p:blipFill>
-          <a:blip r:embed="rId2"/>
-          <a:stretch>
-            <a:fillRect/>
-          </a:stretch>
-        </p:blipFill>
-        <p:spPr>
-          <a:xfrm>
-            <a:off x="12700" y="1079500"/>
-            <a:ext cx="2959100" cy="2235200"/>
-          </a:xfrm>
-          <a:prstGeom prst="rect">
-            <a:avLst/>
-          </a:prstGeom>
-        </p:spPr>
-      </p:pic>
-      <p:pic>
-        <p:nvPicPr>
-          <p:cNvPr id="15" name="Picture 14" descr="image.png"/>
-          <p:cNvPicPr>
-            <a:picLocks noChangeAspect="1"/>
-          </p:cNvPicPr>
-          <p:nvPr/>
-        </p:nvPicPr>
-        <p:blipFill>
-          <a:blip r:embed="rId3"/>
-          <a:stretch>
-            <a:fillRect/>
-          </a:stretch>
-        </p:blipFill>
-        <p:spPr>
-          <a:xfrm>
-            <a:off x="3035300" y="1079500"/>
-            <a:ext cx="2959100" cy="2235200"/>
-          </a:xfrm>
-          <a:prstGeom prst="rect">
-            <a:avLst/>
-          </a:prstGeom>
-        </p:spPr>
-      </p:pic>
-      <p:pic>
-        <p:nvPicPr>
-          <p:cNvPr id="16" name="Picture 15" descr="image.png"/>
-          <p:cNvPicPr>
-            <a:picLocks noChangeAspect="1"/>
-          </p:cNvPicPr>
-          <p:nvPr/>
-        </p:nvPicPr>
-        <p:blipFill>
-          <a:blip r:embed="rId4"/>
-          <a:stretch>
-            <a:fillRect/>
-          </a:stretch>
-        </p:blipFill>
-        <p:spPr>
-          <a:xfrm>
-            <a:off x="6057900" y="1079500"/>
-            <a:ext cx="2959100" cy="2235200"/>
-          </a:xfrm>
-          <a:prstGeom prst="rect">
-            <a:avLst/>
-          </a:prstGeom>
-        </p:spPr>
-      </p:pic>
-      <p:pic>
-        <p:nvPicPr>
-          <p:cNvPr id="17" name="Picture 16" descr="image.png"/>
-          <p:cNvPicPr>
-            <a:picLocks noChangeAspect="1"/>
-          </p:cNvPicPr>
-          <p:nvPr/>
-        </p:nvPicPr>
-        <p:blipFill>
-          <a:blip r:embed="rId2"/>
-          <a:stretch>
-            <a:fillRect/>
-          </a:stretch>
-        </p:blipFill>
-        <p:spPr>
-          <a:xfrm>
-            <a:off x="12700" y="1079500"/>
-            <a:ext cx="2959100" cy="2235200"/>
-          </a:xfrm>
-          <a:prstGeom prst="rect">
-            <a:avLst/>
-          </a:prstGeom>
-        </p:spPr>
-      </p:pic>
-      <p:pic>
-        <p:nvPicPr>
-          <p:cNvPr id="18" name="Picture 17" descr="image.png"/>
-          <p:cNvPicPr>
-            <a:picLocks noChangeAspect="1"/>
-          </p:cNvPicPr>
-          <p:nvPr/>
-        </p:nvPicPr>
-        <p:blipFill>
-          <a:blip r:embed="rId3"/>
-          <a:stretch>
-            <a:fillRect/>
-          </a:stretch>
-        </p:blipFill>
-        <p:spPr>
-          <a:xfrm>
-            <a:off x="3035300" y="1079500"/>
-            <a:ext cx="2959100" cy="2235200"/>
-          </a:xfrm>
-          <a:prstGeom prst="rect">
-            <a:avLst/>
-          </a:prstGeom>
-        </p:spPr>
-      </p:pic>
-      <p:pic>
-        <p:nvPicPr>
-          <p:cNvPr id="19" name="Picture 18" descr="image.png"/>
-          <p:cNvPicPr>
-            <a:picLocks noChangeAspect="1"/>
-          </p:cNvPicPr>
-          <p:nvPr/>
-        </p:nvPicPr>
-        <p:blipFill>
-          <a:blip r:embed="rId4"/>
-          <a:stretch>
-            <a:fillRect/>
-          </a:stretch>
-        </p:blipFill>
-        <p:spPr>
-          <a:xfrm>
-            <a:off x="6057900" y="1079500"/>
-            <a:ext cx="2959100" cy="2235200"/>
-          </a:xfrm>
-          <a:prstGeom prst="rect">
-            <a:avLst/>
-          </a:prstGeom>
-        </p:spPr>
-      </p:pic>
-      <p:pic>
-        <p:nvPicPr>
-          <p:cNvPr id="20" name="Picture 19" descr="image.png"/>
-          <p:cNvPicPr>
-            <a:picLocks noChangeAspect="1"/>
-          </p:cNvPicPr>
-          <p:nvPr/>
-        </p:nvPicPr>
-        <p:blipFill>
-          <a:blip r:embed="rId2"/>
-          <a:stretch>
-            <a:fillRect/>
-          </a:stretch>
-        </p:blipFill>
-        <p:spPr>
-          <a:xfrm>
-            <a:off x="12700" y="1079500"/>
-            <a:ext cx="2959100" cy="2235200"/>
-          </a:xfrm>
-          <a:prstGeom prst="rect">
-            <a:avLst/>
-          </a:prstGeom>
-        </p:spPr>
-      </p:pic>
-      <p:pic>
-        <p:nvPicPr>
-          <p:cNvPr id="21" name="Picture 20" descr="image.png"/>
-          <p:cNvPicPr>
-            <a:picLocks noChangeAspect="1"/>
-          </p:cNvPicPr>
-          <p:nvPr/>
-        </p:nvPicPr>
-        <p:blipFill>
-          <a:blip r:embed="rId3"/>
-          <a:stretch>
-            <a:fillRect/>
-          </a:stretch>
-        </p:blipFill>
-        <p:spPr>
-          <a:xfrm>
-            <a:off x="3035300" y="1079500"/>
-            <a:ext cx="2959100" cy="2235200"/>
-          </a:xfrm>
-          <a:prstGeom prst="rect">
-            <a:avLst/>
-          </a:prstGeom>
-        </p:spPr>
-      </p:pic>
-      <p:pic>
-        <p:nvPicPr>
-          <p:cNvPr id="22" name="Picture 21" descr="image.png"/>
-          <p:cNvPicPr>
-            <a:picLocks noChangeAspect="1"/>
-          </p:cNvPicPr>
-          <p:nvPr/>
-        </p:nvPicPr>
-        <p:blipFill>
-          <a:blip r:embed="rId4"/>
-          <a:stretch>
-            <a:fillRect/>
-          </a:stretch>
-        </p:blipFill>
-        <p:spPr>
-          <a:xfrm>
-            <a:off x="6057900" y="1079500"/>
-            <a:ext cx="2959100" cy="2235200"/>
-          </a:xfrm>
-          <a:prstGeom prst="rect">
-            <a:avLst/>
-          </a:prstGeom>
-        </p:spPr>
-      </p:pic>
-      <p:pic>
-        <p:nvPicPr>
-          <p:cNvPr id="23" name="Picture 22" descr="image.png"/>
-          <p:cNvPicPr>
-            <a:picLocks noChangeAspect="1"/>
-          </p:cNvPicPr>
-          <p:nvPr/>
-        </p:nvPicPr>
-        <p:blipFill>
-          <a:blip r:embed="rId2"/>
-          <a:stretch>
-            <a:fillRect/>
-          </a:stretch>
-        </p:blipFill>
-        <p:spPr>
-          <a:xfrm>
-            <a:off x="12700" y="1079500"/>
-            <a:ext cx="2959100" cy="2235200"/>
-          </a:xfrm>
-          <a:prstGeom prst="rect">
-            <a:avLst/>
-          </a:prstGeom>
-        </p:spPr>
-      </p:pic>
-      <p:pic>
-        <p:nvPicPr>
-          <p:cNvPr id="24" name="Picture 23" descr="image.png"/>
-          <p:cNvPicPr>
-            <a:picLocks noChangeAspect="1"/>
-          </p:cNvPicPr>
-          <p:nvPr/>
-        </p:nvPicPr>
-        <p:blipFill>
-          <a:blip r:embed="rId3"/>
-          <a:stretch>
-            <a:fillRect/>
-          </a:stretch>
-        </p:blipFill>
-        <p:spPr>
-          <a:xfrm>
-            <a:off x="3035300" y="1079500"/>
-            <a:ext cx="2959100" cy="2235200"/>
-          </a:xfrm>
-          <a:prstGeom prst="rect">
-            <a:avLst/>
-          </a:prstGeom>
-        </p:spPr>
-      </p:pic>
-      <p:pic>
-        <p:nvPicPr>
-          <p:cNvPr id="25" name="Picture 24" descr="image.png"/>
-          <p:cNvPicPr>
-            <a:picLocks noChangeAspect="1"/>
-          </p:cNvPicPr>
-          <p:nvPr/>
-        </p:nvPicPr>
-        <p:blipFill>
-          <a:blip r:embed="rId4"/>
-          <a:stretch>
-            <a:fillRect/>
-          </a:stretch>
-        </p:blipFill>
-        <p:spPr>
-          <a:xfrm>
-            <a:off x="6057900" y="1079500"/>
-            <a:ext cx="2959100" cy="2235200"/>
+            <a:off x="4572000" y="1079500"/>
+            <a:ext cx="4546600" cy="3429000"/>
           </a:xfrm>
           <a:prstGeom prst="rect">
             <a:avLst/>
@@ -12935,7 +10751,7 @@
           <a:p>
             <a:r>
               <a:rPr lang="en-US" dirty="0"/>
-              <a:t>5537_-_State_37_LHS_E_Field | VT-15 Electric Fields</a:t>
+              <a:t>5537_-_State_7_-_RRBB | VT-01 Off-Board Emissions (3m)</a:t>
             </a:r>
           </a:p>
         </p:txBody>
@@ -12994,7 +10810,7 @@
         <p:spPr>
           <a:xfrm>
             <a:off x="12700" y="1079500"/>
-            <a:ext cx="2959100" cy="2235200"/>
+            <a:ext cx="4546600" cy="3429000"/>
           </a:xfrm>
           <a:prstGeom prst="rect">
             <a:avLst/>
@@ -13017,464 +10833,8 @@
         </p:blipFill>
         <p:spPr>
           <a:xfrm>
-            <a:off x="3035300" y="1079500"/>
-            <a:ext cx="2959100" cy="2235200"/>
-          </a:xfrm>
-          <a:prstGeom prst="rect">
-            <a:avLst/>
-          </a:prstGeom>
-        </p:spPr>
-      </p:pic>
-      <p:pic>
-        <p:nvPicPr>
-          <p:cNvPr id="7" name="Picture 6" descr="image.png"/>
-          <p:cNvPicPr>
-            <a:picLocks noChangeAspect="1"/>
-          </p:cNvPicPr>
-          <p:nvPr/>
-        </p:nvPicPr>
-        <p:blipFill>
-          <a:blip r:embed="rId4"/>
-          <a:stretch>
-            <a:fillRect/>
-          </a:stretch>
-        </p:blipFill>
-        <p:spPr>
-          <a:xfrm>
-            <a:off x="6057900" y="1079500"/>
-            <a:ext cx="2959100" cy="2235200"/>
-          </a:xfrm>
-          <a:prstGeom prst="rect">
-            <a:avLst/>
-          </a:prstGeom>
-        </p:spPr>
-      </p:pic>
-      <p:pic>
-        <p:nvPicPr>
-          <p:cNvPr id="8" name="Picture 7" descr="image.png"/>
-          <p:cNvPicPr>
-            <a:picLocks noChangeAspect="1"/>
-          </p:cNvPicPr>
-          <p:nvPr/>
-        </p:nvPicPr>
-        <p:blipFill>
-          <a:blip r:embed="rId2"/>
-          <a:stretch>
-            <a:fillRect/>
-          </a:stretch>
-        </p:blipFill>
-        <p:spPr>
-          <a:xfrm>
-            <a:off x="12700" y="1079500"/>
-            <a:ext cx="2959100" cy="2235200"/>
-          </a:xfrm>
-          <a:prstGeom prst="rect">
-            <a:avLst/>
-          </a:prstGeom>
-        </p:spPr>
-      </p:pic>
-      <p:pic>
-        <p:nvPicPr>
-          <p:cNvPr id="9" name="Picture 8" descr="image.png"/>
-          <p:cNvPicPr>
-            <a:picLocks noChangeAspect="1"/>
-          </p:cNvPicPr>
-          <p:nvPr/>
-        </p:nvPicPr>
-        <p:blipFill>
-          <a:blip r:embed="rId3"/>
-          <a:stretch>
-            <a:fillRect/>
-          </a:stretch>
-        </p:blipFill>
-        <p:spPr>
-          <a:xfrm>
-            <a:off x="3035300" y="1079500"/>
-            <a:ext cx="2959100" cy="2235200"/>
-          </a:xfrm>
-          <a:prstGeom prst="rect">
-            <a:avLst/>
-          </a:prstGeom>
-        </p:spPr>
-      </p:pic>
-      <p:pic>
-        <p:nvPicPr>
-          <p:cNvPr id="10" name="Picture 9" descr="image.png"/>
-          <p:cNvPicPr>
-            <a:picLocks noChangeAspect="1"/>
-          </p:cNvPicPr>
-          <p:nvPr/>
-        </p:nvPicPr>
-        <p:blipFill>
-          <a:blip r:embed="rId4"/>
-          <a:stretch>
-            <a:fillRect/>
-          </a:stretch>
-        </p:blipFill>
-        <p:spPr>
-          <a:xfrm>
-            <a:off x="6057900" y="1079500"/>
-            <a:ext cx="2959100" cy="2235200"/>
-          </a:xfrm>
-          <a:prstGeom prst="rect">
-            <a:avLst/>
-          </a:prstGeom>
-        </p:spPr>
-      </p:pic>
-      <p:pic>
-        <p:nvPicPr>
-          <p:cNvPr id="11" name="Picture 10" descr="image.png"/>
-          <p:cNvPicPr>
-            <a:picLocks noChangeAspect="1"/>
-          </p:cNvPicPr>
-          <p:nvPr/>
-        </p:nvPicPr>
-        <p:blipFill>
-          <a:blip r:embed="rId2"/>
-          <a:stretch>
-            <a:fillRect/>
-          </a:stretch>
-        </p:blipFill>
-        <p:spPr>
-          <a:xfrm>
-            <a:off x="12700" y="1079500"/>
-            <a:ext cx="2959100" cy="2235200"/>
-          </a:xfrm>
-          <a:prstGeom prst="rect">
-            <a:avLst/>
-          </a:prstGeom>
-        </p:spPr>
-      </p:pic>
-      <p:pic>
-        <p:nvPicPr>
-          <p:cNvPr id="12" name="Picture 11" descr="image.png"/>
-          <p:cNvPicPr>
-            <a:picLocks noChangeAspect="1"/>
-          </p:cNvPicPr>
-          <p:nvPr/>
-        </p:nvPicPr>
-        <p:blipFill>
-          <a:blip r:embed="rId3"/>
-          <a:stretch>
-            <a:fillRect/>
-          </a:stretch>
-        </p:blipFill>
-        <p:spPr>
-          <a:xfrm>
-            <a:off x="3035300" y="1079500"/>
-            <a:ext cx="2959100" cy="2235200"/>
-          </a:xfrm>
-          <a:prstGeom prst="rect">
-            <a:avLst/>
-          </a:prstGeom>
-        </p:spPr>
-      </p:pic>
-      <p:pic>
-        <p:nvPicPr>
-          <p:cNvPr id="13" name="Picture 12" descr="image.png"/>
-          <p:cNvPicPr>
-            <a:picLocks noChangeAspect="1"/>
-          </p:cNvPicPr>
-          <p:nvPr/>
-        </p:nvPicPr>
-        <p:blipFill>
-          <a:blip r:embed="rId4"/>
-          <a:stretch>
-            <a:fillRect/>
-          </a:stretch>
-        </p:blipFill>
-        <p:spPr>
-          <a:xfrm>
-            <a:off x="6057900" y="1079500"/>
-            <a:ext cx="2959100" cy="2235200"/>
-          </a:xfrm>
-          <a:prstGeom prst="rect">
-            <a:avLst/>
-          </a:prstGeom>
-        </p:spPr>
-      </p:pic>
-      <p:pic>
-        <p:nvPicPr>
-          <p:cNvPr id="14" name="Picture 13" descr="image.png"/>
-          <p:cNvPicPr>
-            <a:picLocks noChangeAspect="1"/>
-          </p:cNvPicPr>
-          <p:nvPr/>
-        </p:nvPicPr>
-        <p:blipFill>
-          <a:blip r:embed="rId2"/>
-          <a:stretch>
-            <a:fillRect/>
-          </a:stretch>
-        </p:blipFill>
-        <p:spPr>
-          <a:xfrm>
-            <a:off x="12700" y="1079500"/>
-            <a:ext cx="2959100" cy="2235200"/>
-          </a:xfrm>
-          <a:prstGeom prst="rect">
-            <a:avLst/>
-          </a:prstGeom>
-        </p:spPr>
-      </p:pic>
-      <p:pic>
-        <p:nvPicPr>
-          <p:cNvPr id="15" name="Picture 14" descr="image.png"/>
-          <p:cNvPicPr>
-            <a:picLocks noChangeAspect="1"/>
-          </p:cNvPicPr>
-          <p:nvPr/>
-        </p:nvPicPr>
-        <p:blipFill>
-          <a:blip r:embed="rId3"/>
-          <a:stretch>
-            <a:fillRect/>
-          </a:stretch>
-        </p:blipFill>
-        <p:spPr>
-          <a:xfrm>
-            <a:off x="3035300" y="1079500"/>
-            <a:ext cx="2959100" cy="2235200"/>
-          </a:xfrm>
-          <a:prstGeom prst="rect">
-            <a:avLst/>
-          </a:prstGeom>
-        </p:spPr>
-      </p:pic>
-      <p:pic>
-        <p:nvPicPr>
-          <p:cNvPr id="16" name="Picture 15" descr="image.png"/>
-          <p:cNvPicPr>
-            <a:picLocks noChangeAspect="1"/>
-          </p:cNvPicPr>
-          <p:nvPr/>
-        </p:nvPicPr>
-        <p:blipFill>
-          <a:blip r:embed="rId4"/>
-          <a:stretch>
-            <a:fillRect/>
-          </a:stretch>
-        </p:blipFill>
-        <p:spPr>
-          <a:xfrm>
-            <a:off x="6057900" y="1079500"/>
-            <a:ext cx="2959100" cy="2235200"/>
-          </a:xfrm>
-          <a:prstGeom prst="rect">
-            <a:avLst/>
-          </a:prstGeom>
-        </p:spPr>
-      </p:pic>
-      <p:pic>
-        <p:nvPicPr>
-          <p:cNvPr id="17" name="Picture 16" descr="image.png"/>
-          <p:cNvPicPr>
-            <a:picLocks noChangeAspect="1"/>
-          </p:cNvPicPr>
-          <p:nvPr/>
-        </p:nvPicPr>
-        <p:blipFill>
-          <a:blip r:embed="rId2"/>
-          <a:stretch>
-            <a:fillRect/>
-          </a:stretch>
-        </p:blipFill>
-        <p:spPr>
-          <a:xfrm>
-            <a:off x="12700" y="1079500"/>
-            <a:ext cx="2959100" cy="2235200"/>
-          </a:xfrm>
-          <a:prstGeom prst="rect">
-            <a:avLst/>
-          </a:prstGeom>
-        </p:spPr>
-      </p:pic>
-      <p:pic>
-        <p:nvPicPr>
-          <p:cNvPr id="18" name="Picture 17" descr="image.png"/>
-          <p:cNvPicPr>
-            <a:picLocks noChangeAspect="1"/>
-          </p:cNvPicPr>
-          <p:nvPr/>
-        </p:nvPicPr>
-        <p:blipFill>
-          <a:blip r:embed="rId3"/>
-          <a:stretch>
-            <a:fillRect/>
-          </a:stretch>
-        </p:blipFill>
-        <p:spPr>
-          <a:xfrm>
-            <a:off x="3035300" y="1079500"/>
-            <a:ext cx="2959100" cy="2235200"/>
-          </a:xfrm>
-          <a:prstGeom prst="rect">
-            <a:avLst/>
-          </a:prstGeom>
-        </p:spPr>
-      </p:pic>
-      <p:pic>
-        <p:nvPicPr>
-          <p:cNvPr id="19" name="Picture 18" descr="image.png"/>
-          <p:cNvPicPr>
-            <a:picLocks noChangeAspect="1"/>
-          </p:cNvPicPr>
-          <p:nvPr/>
-        </p:nvPicPr>
-        <p:blipFill>
-          <a:blip r:embed="rId4"/>
-          <a:stretch>
-            <a:fillRect/>
-          </a:stretch>
-        </p:blipFill>
-        <p:spPr>
-          <a:xfrm>
-            <a:off x="6057900" y="1079500"/>
-            <a:ext cx="2959100" cy="2235200"/>
-          </a:xfrm>
-          <a:prstGeom prst="rect">
-            <a:avLst/>
-          </a:prstGeom>
-        </p:spPr>
-      </p:pic>
-      <p:pic>
-        <p:nvPicPr>
-          <p:cNvPr id="20" name="Picture 19" descr="image.png"/>
-          <p:cNvPicPr>
-            <a:picLocks noChangeAspect="1"/>
-          </p:cNvPicPr>
-          <p:nvPr/>
-        </p:nvPicPr>
-        <p:blipFill>
-          <a:blip r:embed="rId2"/>
-          <a:stretch>
-            <a:fillRect/>
-          </a:stretch>
-        </p:blipFill>
-        <p:spPr>
-          <a:xfrm>
-            <a:off x="12700" y="1079500"/>
-            <a:ext cx="2959100" cy="2235200"/>
-          </a:xfrm>
-          <a:prstGeom prst="rect">
-            <a:avLst/>
-          </a:prstGeom>
-        </p:spPr>
-      </p:pic>
-      <p:pic>
-        <p:nvPicPr>
-          <p:cNvPr id="21" name="Picture 20" descr="image.png"/>
-          <p:cNvPicPr>
-            <a:picLocks noChangeAspect="1"/>
-          </p:cNvPicPr>
-          <p:nvPr/>
-        </p:nvPicPr>
-        <p:blipFill>
-          <a:blip r:embed="rId3"/>
-          <a:stretch>
-            <a:fillRect/>
-          </a:stretch>
-        </p:blipFill>
-        <p:spPr>
-          <a:xfrm>
-            <a:off x="3035300" y="1079500"/>
-            <a:ext cx="2959100" cy="2235200"/>
-          </a:xfrm>
-          <a:prstGeom prst="rect">
-            <a:avLst/>
-          </a:prstGeom>
-        </p:spPr>
-      </p:pic>
-      <p:pic>
-        <p:nvPicPr>
-          <p:cNvPr id="22" name="Picture 21" descr="image.png"/>
-          <p:cNvPicPr>
-            <a:picLocks noChangeAspect="1"/>
-          </p:cNvPicPr>
-          <p:nvPr/>
-        </p:nvPicPr>
-        <p:blipFill>
-          <a:blip r:embed="rId4"/>
-          <a:stretch>
-            <a:fillRect/>
-          </a:stretch>
-        </p:blipFill>
-        <p:spPr>
-          <a:xfrm>
-            <a:off x="6057900" y="1079500"/>
-            <a:ext cx="2959100" cy="2235200"/>
-          </a:xfrm>
-          <a:prstGeom prst="rect">
-            <a:avLst/>
-          </a:prstGeom>
-        </p:spPr>
-      </p:pic>
-      <p:pic>
-        <p:nvPicPr>
-          <p:cNvPr id="23" name="Picture 22" descr="image.png"/>
-          <p:cNvPicPr>
-            <a:picLocks noChangeAspect="1"/>
-          </p:cNvPicPr>
-          <p:nvPr/>
-        </p:nvPicPr>
-        <p:blipFill>
-          <a:blip r:embed="rId2"/>
-          <a:stretch>
-            <a:fillRect/>
-          </a:stretch>
-        </p:blipFill>
-        <p:spPr>
-          <a:xfrm>
-            <a:off x="12700" y="1079500"/>
-            <a:ext cx="2959100" cy="2235200"/>
-          </a:xfrm>
-          <a:prstGeom prst="rect">
-            <a:avLst/>
-          </a:prstGeom>
-        </p:spPr>
-      </p:pic>
-      <p:pic>
-        <p:nvPicPr>
-          <p:cNvPr id="24" name="Picture 23" descr="image.png"/>
-          <p:cNvPicPr>
-            <a:picLocks noChangeAspect="1"/>
-          </p:cNvPicPr>
-          <p:nvPr/>
-        </p:nvPicPr>
-        <p:blipFill>
-          <a:blip r:embed="rId3"/>
-          <a:stretch>
-            <a:fillRect/>
-          </a:stretch>
-        </p:blipFill>
-        <p:spPr>
-          <a:xfrm>
-            <a:off x="3035300" y="1079500"/>
-            <a:ext cx="2959100" cy="2235200"/>
-          </a:xfrm>
-          <a:prstGeom prst="rect">
-            <a:avLst/>
-          </a:prstGeom>
-        </p:spPr>
-      </p:pic>
-      <p:pic>
-        <p:nvPicPr>
-          <p:cNvPr id="25" name="Picture 24" descr="image.png"/>
-          <p:cNvPicPr>
-            <a:picLocks noChangeAspect="1"/>
-          </p:cNvPicPr>
-          <p:nvPr/>
-        </p:nvPicPr>
-        <p:blipFill>
-          <a:blip r:embed="rId4"/>
-          <a:stretch>
-            <a:fillRect/>
-          </a:stretch>
-        </p:blipFill>
-        <p:spPr>
-          <a:xfrm>
-            <a:off x="6057900" y="1079500"/>
-            <a:ext cx="2959100" cy="2235200"/>
+            <a:off x="4572000" y="1079500"/>
+            <a:ext cx="4546600" cy="3429000"/>
           </a:xfrm>
           <a:prstGeom prst="rect">
             <a:avLst/>
@@ -13568,7 +10928,7 @@
           <a:p>
             <a:r>
               <a:rPr lang="en-US" dirty="0"/>
-              <a:t>5537_-_State_32_Rear_H_Field | VT-15 Magnetic Fields</a:t>
+              <a:t>*8*</a:t>
             </a:r>
           </a:p>
         </p:txBody>
@@ -13610,1014 +10970,6 @@
           </a:p>
         </p:txBody>
       </p:sp>
-      <p:pic>
-        <p:nvPicPr>
-          <p:cNvPr id="5" name="Picture 4" descr="image.png"/>
-          <p:cNvPicPr>
-            <a:picLocks noChangeAspect="1"/>
-          </p:cNvPicPr>
-          <p:nvPr/>
-        </p:nvPicPr>
-        <p:blipFill>
-          <a:blip r:embed="rId2"/>
-          <a:stretch>
-            <a:fillRect/>
-          </a:stretch>
-        </p:blipFill>
-        <p:spPr>
-          <a:xfrm>
-            <a:off x="12700" y="825500"/>
-            <a:ext cx="2806700" cy="2120900"/>
-          </a:xfrm>
-          <a:prstGeom prst="rect">
-            <a:avLst/>
-          </a:prstGeom>
-        </p:spPr>
-      </p:pic>
-      <p:pic>
-        <p:nvPicPr>
-          <p:cNvPr id="6" name="Picture 5" descr="image.png"/>
-          <p:cNvPicPr>
-            <a:picLocks noChangeAspect="1"/>
-          </p:cNvPicPr>
-          <p:nvPr/>
-        </p:nvPicPr>
-        <p:blipFill>
-          <a:blip r:embed="rId3"/>
-          <a:stretch>
-            <a:fillRect/>
-          </a:stretch>
-        </p:blipFill>
-        <p:spPr>
-          <a:xfrm>
-            <a:off x="3035300" y="825500"/>
-            <a:ext cx="2806700" cy="2120900"/>
-          </a:xfrm>
-          <a:prstGeom prst="rect">
-            <a:avLst/>
-          </a:prstGeom>
-        </p:spPr>
-      </p:pic>
-      <p:pic>
-        <p:nvPicPr>
-          <p:cNvPr id="7" name="Picture 6" descr="image.png"/>
-          <p:cNvPicPr>
-            <a:picLocks noChangeAspect="1"/>
-          </p:cNvPicPr>
-          <p:nvPr/>
-        </p:nvPicPr>
-        <p:blipFill>
-          <a:blip r:embed="rId4"/>
-          <a:stretch>
-            <a:fillRect/>
-          </a:stretch>
-        </p:blipFill>
-        <p:spPr>
-          <a:xfrm>
-            <a:off x="6057900" y="825500"/>
-            <a:ext cx="2806700" cy="2120900"/>
-          </a:xfrm>
-          <a:prstGeom prst="rect">
-            <a:avLst/>
-          </a:prstGeom>
-        </p:spPr>
-      </p:pic>
-      <p:pic>
-        <p:nvPicPr>
-          <p:cNvPr id="8" name="Picture 7" descr="image.png"/>
-          <p:cNvPicPr>
-            <a:picLocks noChangeAspect="1"/>
-          </p:cNvPicPr>
-          <p:nvPr/>
-        </p:nvPicPr>
-        <p:blipFill>
-          <a:blip r:embed="rId5"/>
-          <a:stretch>
-            <a:fillRect/>
-          </a:stretch>
-        </p:blipFill>
-        <p:spPr>
-          <a:xfrm>
-            <a:off x="12700" y="2984500"/>
-            <a:ext cx="2806700" cy="2120900"/>
-          </a:xfrm>
-          <a:prstGeom prst="rect">
-            <a:avLst/>
-          </a:prstGeom>
-        </p:spPr>
-      </p:pic>
-      <p:pic>
-        <p:nvPicPr>
-          <p:cNvPr id="9" name="Picture 8" descr="image.png"/>
-          <p:cNvPicPr>
-            <a:picLocks noChangeAspect="1"/>
-          </p:cNvPicPr>
-          <p:nvPr/>
-        </p:nvPicPr>
-        <p:blipFill>
-          <a:blip r:embed="rId6"/>
-          <a:stretch>
-            <a:fillRect/>
-          </a:stretch>
-        </p:blipFill>
-        <p:spPr>
-          <a:xfrm>
-            <a:off x="3035300" y="2984500"/>
-            <a:ext cx="2806700" cy="2120900"/>
-          </a:xfrm>
-          <a:prstGeom prst="rect">
-            <a:avLst/>
-          </a:prstGeom>
-        </p:spPr>
-      </p:pic>
-      <p:pic>
-        <p:nvPicPr>
-          <p:cNvPr id="10" name="Picture 9" descr="image.png"/>
-          <p:cNvPicPr>
-            <a:picLocks noChangeAspect="1"/>
-          </p:cNvPicPr>
-          <p:nvPr/>
-        </p:nvPicPr>
-        <p:blipFill>
-          <a:blip r:embed="rId7"/>
-          <a:stretch>
-            <a:fillRect/>
-          </a:stretch>
-        </p:blipFill>
-        <p:spPr>
-          <a:xfrm>
-            <a:off x="6057900" y="2984500"/>
-            <a:ext cx="2806700" cy="2120900"/>
-          </a:xfrm>
-          <a:prstGeom prst="rect">
-            <a:avLst/>
-          </a:prstGeom>
-        </p:spPr>
-      </p:pic>
-      <p:pic>
-        <p:nvPicPr>
-          <p:cNvPr id="11" name="Picture 10" descr="image.png"/>
-          <p:cNvPicPr>
-            <a:picLocks noChangeAspect="1"/>
-          </p:cNvPicPr>
-          <p:nvPr/>
-        </p:nvPicPr>
-        <p:blipFill>
-          <a:blip r:embed="rId2"/>
-          <a:stretch>
-            <a:fillRect/>
-          </a:stretch>
-        </p:blipFill>
-        <p:spPr>
-          <a:xfrm>
-            <a:off x="12700" y="825500"/>
-            <a:ext cx="2806700" cy="2120900"/>
-          </a:xfrm>
-          <a:prstGeom prst="rect">
-            <a:avLst/>
-          </a:prstGeom>
-        </p:spPr>
-      </p:pic>
-      <p:pic>
-        <p:nvPicPr>
-          <p:cNvPr id="12" name="Picture 11" descr="image.png"/>
-          <p:cNvPicPr>
-            <a:picLocks noChangeAspect="1"/>
-          </p:cNvPicPr>
-          <p:nvPr/>
-        </p:nvPicPr>
-        <p:blipFill>
-          <a:blip r:embed="rId3"/>
-          <a:stretch>
-            <a:fillRect/>
-          </a:stretch>
-        </p:blipFill>
-        <p:spPr>
-          <a:xfrm>
-            <a:off x="3035300" y="825500"/>
-            <a:ext cx="2806700" cy="2120900"/>
-          </a:xfrm>
-          <a:prstGeom prst="rect">
-            <a:avLst/>
-          </a:prstGeom>
-        </p:spPr>
-      </p:pic>
-      <p:pic>
-        <p:nvPicPr>
-          <p:cNvPr id="13" name="Picture 12" descr="image.png"/>
-          <p:cNvPicPr>
-            <a:picLocks noChangeAspect="1"/>
-          </p:cNvPicPr>
-          <p:nvPr/>
-        </p:nvPicPr>
-        <p:blipFill>
-          <a:blip r:embed="rId4"/>
-          <a:stretch>
-            <a:fillRect/>
-          </a:stretch>
-        </p:blipFill>
-        <p:spPr>
-          <a:xfrm>
-            <a:off x="6057900" y="825500"/>
-            <a:ext cx="2806700" cy="2120900"/>
-          </a:xfrm>
-          <a:prstGeom prst="rect">
-            <a:avLst/>
-          </a:prstGeom>
-        </p:spPr>
-      </p:pic>
-      <p:pic>
-        <p:nvPicPr>
-          <p:cNvPr id="14" name="Picture 13" descr="image.png"/>
-          <p:cNvPicPr>
-            <a:picLocks noChangeAspect="1"/>
-          </p:cNvPicPr>
-          <p:nvPr/>
-        </p:nvPicPr>
-        <p:blipFill>
-          <a:blip r:embed="rId5"/>
-          <a:stretch>
-            <a:fillRect/>
-          </a:stretch>
-        </p:blipFill>
-        <p:spPr>
-          <a:xfrm>
-            <a:off x="12700" y="2984500"/>
-            <a:ext cx="2806700" cy="2120900"/>
-          </a:xfrm>
-          <a:prstGeom prst="rect">
-            <a:avLst/>
-          </a:prstGeom>
-        </p:spPr>
-      </p:pic>
-      <p:pic>
-        <p:nvPicPr>
-          <p:cNvPr id="15" name="Picture 14" descr="image.png"/>
-          <p:cNvPicPr>
-            <a:picLocks noChangeAspect="1"/>
-          </p:cNvPicPr>
-          <p:nvPr/>
-        </p:nvPicPr>
-        <p:blipFill>
-          <a:blip r:embed="rId6"/>
-          <a:stretch>
-            <a:fillRect/>
-          </a:stretch>
-        </p:blipFill>
-        <p:spPr>
-          <a:xfrm>
-            <a:off x="3035300" y="2984500"/>
-            <a:ext cx="2806700" cy="2120900"/>
-          </a:xfrm>
-          <a:prstGeom prst="rect">
-            <a:avLst/>
-          </a:prstGeom>
-        </p:spPr>
-      </p:pic>
-      <p:pic>
-        <p:nvPicPr>
-          <p:cNvPr id="16" name="Picture 15" descr="image.png"/>
-          <p:cNvPicPr>
-            <a:picLocks noChangeAspect="1"/>
-          </p:cNvPicPr>
-          <p:nvPr/>
-        </p:nvPicPr>
-        <p:blipFill>
-          <a:blip r:embed="rId7"/>
-          <a:stretch>
-            <a:fillRect/>
-          </a:stretch>
-        </p:blipFill>
-        <p:spPr>
-          <a:xfrm>
-            <a:off x="6057900" y="2984500"/>
-            <a:ext cx="2806700" cy="2120900"/>
-          </a:xfrm>
-          <a:prstGeom prst="rect">
-            <a:avLst/>
-          </a:prstGeom>
-        </p:spPr>
-      </p:pic>
-      <p:pic>
-        <p:nvPicPr>
-          <p:cNvPr id="17" name="Picture 16" descr="image.png"/>
-          <p:cNvPicPr>
-            <a:picLocks noChangeAspect="1"/>
-          </p:cNvPicPr>
-          <p:nvPr/>
-        </p:nvPicPr>
-        <p:blipFill>
-          <a:blip r:embed="rId2"/>
-          <a:stretch>
-            <a:fillRect/>
-          </a:stretch>
-        </p:blipFill>
-        <p:spPr>
-          <a:xfrm>
-            <a:off x="12700" y="825500"/>
-            <a:ext cx="2806700" cy="2120900"/>
-          </a:xfrm>
-          <a:prstGeom prst="rect">
-            <a:avLst/>
-          </a:prstGeom>
-        </p:spPr>
-      </p:pic>
-      <p:pic>
-        <p:nvPicPr>
-          <p:cNvPr id="18" name="Picture 17" descr="image.png"/>
-          <p:cNvPicPr>
-            <a:picLocks noChangeAspect="1"/>
-          </p:cNvPicPr>
-          <p:nvPr/>
-        </p:nvPicPr>
-        <p:blipFill>
-          <a:blip r:embed="rId3"/>
-          <a:stretch>
-            <a:fillRect/>
-          </a:stretch>
-        </p:blipFill>
-        <p:spPr>
-          <a:xfrm>
-            <a:off x="3035300" y="825500"/>
-            <a:ext cx="2806700" cy="2120900"/>
-          </a:xfrm>
-          <a:prstGeom prst="rect">
-            <a:avLst/>
-          </a:prstGeom>
-        </p:spPr>
-      </p:pic>
-      <p:pic>
-        <p:nvPicPr>
-          <p:cNvPr id="19" name="Picture 18" descr="image.png"/>
-          <p:cNvPicPr>
-            <a:picLocks noChangeAspect="1"/>
-          </p:cNvPicPr>
-          <p:nvPr/>
-        </p:nvPicPr>
-        <p:blipFill>
-          <a:blip r:embed="rId4"/>
-          <a:stretch>
-            <a:fillRect/>
-          </a:stretch>
-        </p:blipFill>
-        <p:spPr>
-          <a:xfrm>
-            <a:off x="6057900" y="825500"/>
-            <a:ext cx="2806700" cy="2120900"/>
-          </a:xfrm>
-          <a:prstGeom prst="rect">
-            <a:avLst/>
-          </a:prstGeom>
-        </p:spPr>
-      </p:pic>
-      <p:pic>
-        <p:nvPicPr>
-          <p:cNvPr id="20" name="Picture 19" descr="image.png"/>
-          <p:cNvPicPr>
-            <a:picLocks noChangeAspect="1"/>
-          </p:cNvPicPr>
-          <p:nvPr/>
-        </p:nvPicPr>
-        <p:blipFill>
-          <a:blip r:embed="rId5"/>
-          <a:stretch>
-            <a:fillRect/>
-          </a:stretch>
-        </p:blipFill>
-        <p:spPr>
-          <a:xfrm>
-            <a:off x="12700" y="2984500"/>
-            <a:ext cx="2806700" cy="2120900"/>
-          </a:xfrm>
-          <a:prstGeom prst="rect">
-            <a:avLst/>
-          </a:prstGeom>
-        </p:spPr>
-      </p:pic>
-      <p:pic>
-        <p:nvPicPr>
-          <p:cNvPr id="21" name="Picture 20" descr="image.png"/>
-          <p:cNvPicPr>
-            <a:picLocks noChangeAspect="1"/>
-          </p:cNvPicPr>
-          <p:nvPr/>
-        </p:nvPicPr>
-        <p:blipFill>
-          <a:blip r:embed="rId6"/>
-          <a:stretch>
-            <a:fillRect/>
-          </a:stretch>
-        </p:blipFill>
-        <p:spPr>
-          <a:xfrm>
-            <a:off x="3035300" y="2984500"/>
-            <a:ext cx="2806700" cy="2120900"/>
-          </a:xfrm>
-          <a:prstGeom prst="rect">
-            <a:avLst/>
-          </a:prstGeom>
-        </p:spPr>
-      </p:pic>
-      <p:pic>
-        <p:nvPicPr>
-          <p:cNvPr id="22" name="Picture 21" descr="image.png"/>
-          <p:cNvPicPr>
-            <a:picLocks noChangeAspect="1"/>
-          </p:cNvPicPr>
-          <p:nvPr/>
-        </p:nvPicPr>
-        <p:blipFill>
-          <a:blip r:embed="rId7"/>
-          <a:stretch>
-            <a:fillRect/>
-          </a:stretch>
-        </p:blipFill>
-        <p:spPr>
-          <a:xfrm>
-            <a:off x="6057900" y="2984500"/>
-            <a:ext cx="2806700" cy="2120900"/>
-          </a:xfrm>
-          <a:prstGeom prst="rect">
-            <a:avLst/>
-          </a:prstGeom>
-        </p:spPr>
-      </p:pic>
-      <p:pic>
-        <p:nvPicPr>
-          <p:cNvPr id="23" name="Picture 22" descr="image.png"/>
-          <p:cNvPicPr>
-            <a:picLocks noChangeAspect="1"/>
-          </p:cNvPicPr>
-          <p:nvPr/>
-        </p:nvPicPr>
-        <p:blipFill>
-          <a:blip r:embed="rId2"/>
-          <a:stretch>
-            <a:fillRect/>
-          </a:stretch>
-        </p:blipFill>
-        <p:spPr>
-          <a:xfrm>
-            <a:off x="12700" y="825500"/>
-            <a:ext cx="2806700" cy="2120900"/>
-          </a:xfrm>
-          <a:prstGeom prst="rect">
-            <a:avLst/>
-          </a:prstGeom>
-        </p:spPr>
-      </p:pic>
-      <p:pic>
-        <p:nvPicPr>
-          <p:cNvPr id="24" name="Picture 23" descr="image.png"/>
-          <p:cNvPicPr>
-            <a:picLocks noChangeAspect="1"/>
-          </p:cNvPicPr>
-          <p:nvPr/>
-        </p:nvPicPr>
-        <p:blipFill>
-          <a:blip r:embed="rId3"/>
-          <a:stretch>
-            <a:fillRect/>
-          </a:stretch>
-        </p:blipFill>
-        <p:spPr>
-          <a:xfrm>
-            <a:off x="3035300" y="825500"/>
-            <a:ext cx="2806700" cy="2120900"/>
-          </a:xfrm>
-          <a:prstGeom prst="rect">
-            <a:avLst/>
-          </a:prstGeom>
-        </p:spPr>
-      </p:pic>
-      <p:pic>
-        <p:nvPicPr>
-          <p:cNvPr id="25" name="Picture 24" descr="image.png"/>
-          <p:cNvPicPr>
-            <a:picLocks noChangeAspect="1"/>
-          </p:cNvPicPr>
-          <p:nvPr/>
-        </p:nvPicPr>
-        <p:blipFill>
-          <a:blip r:embed="rId4"/>
-          <a:stretch>
-            <a:fillRect/>
-          </a:stretch>
-        </p:blipFill>
-        <p:spPr>
-          <a:xfrm>
-            <a:off x="6057900" y="825500"/>
-            <a:ext cx="2806700" cy="2120900"/>
-          </a:xfrm>
-          <a:prstGeom prst="rect">
-            <a:avLst/>
-          </a:prstGeom>
-        </p:spPr>
-      </p:pic>
-      <p:pic>
-        <p:nvPicPr>
-          <p:cNvPr id="26" name="Picture 25" descr="image.png"/>
-          <p:cNvPicPr>
-            <a:picLocks noChangeAspect="1"/>
-          </p:cNvPicPr>
-          <p:nvPr/>
-        </p:nvPicPr>
-        <p:blipFill>
-          <a:blip r:embed="rId5"/>
-          <a:stretch>
-            <a:fillRect/>
-          </a:stretch>
-        </p:blipFill>
-        <p:spPr>
-          <a:xfrm>
-            <a:off x="12700" y="2984500"/>
-            <a:ext cx="2806700" cy="2120900"/>
-          </a:xfrm>
-          <a:prstGeom prst="rect">
-            <a:avLst/>
-          </a:prstGeom>
-        </p:spPr>
-      </p:pic>
-      <p:pic>
-        <p:nvPicPr>
-          <p:cNvPr id="27" name="Picture 26" descr="image.png"/>
-          <p:cNvPicPr>
-            <a:picLocks noChangeAspect="1"/>
-          </p:cNvPicPr>
-          <p:nvPr/>
-        </p:nvPicPr>
-        <p:blipFill>
-          <a:blip r:embed="rId6"/>
-          <a:stretch>
-            <a:fillRect/>
-          </a:stretch>
-        </p:blipFill>
-        <p:spPr>
-          <a:xfrm>
-            <a:off x="3035300" y="2984500"/>
-            <a:ext cx="2806700" cy="2120900"/>
-          </a:xfrm>
-          <a:prstGeom prst="rect">
-            <a:avLst/>
-          </a:prstGeom>
-        </p:spPr>
-      </p:pic>
-      <p:pic>
-        <p:nvPicPr>
-          <p:cNvPr id="28" name="Picture 27" descr="image.png"/>
-          <p:cNvPicPr>
-            <a:picLocks noChangeAspect="1"/>
-          </p:cNvPicPr>
-          <p:nvPr/>
-        </p:nvPicPr>
-        <p:blipFill>
-          <a:blip r:embed="rId7"/>
-          <a:stretch>
-            <a:fillRect/>
-          </a:stretch>
-        </p:blipFill>
-        <p:spPr>
-          <a:xfrm>
-            <a:off x="6057900" y="2984500"/>
-            <a:ext cx="2806700" cy="2120900"/>
-          </a:xfrm>
-          <a:prstGeom prst="rect">
-            <a:avLst/>
-          </a:prstGeom>
-        </p:spPr>
-      </p:pic>
-      <p:pic>
-        <p:nvPicPr>
-          <p:cNvPr id="29" name="Picture 28" descr="image.png"/>
-          <p:cNvPicPr>
-            <a:picLocks noChangeAspect="1"/>
-          </p:cNvPicPr>
-          <p:nvPr/>
-        </p:nvPicPr>
-        <p:blipFill>
-          <a:blip r:embed="rId2"/>
-          <a:stretch>
-            <a:fillRect/>
-          </a:stretch>
-        </p:blipFill>
-        <p:spPr>
-          <a:xfrm>
-            <a:off x="12700" y="825500"/>
-            <a:ext cx="2806700" cy="2120900"/>
-          </a:xfrm>
-          <a:prstGeom prst="rect">
-            <a:avLst/>
-          </a:prstGeom>
-        </p:spPr>
-      </p:pic>
-      <p:pic>
-        <p:nvPicPr>
-          <p:cNvPr id="30" name="Picture 29" descr="image.png"/>
-          <p:cNvPicPr>
-            <a:picLocks noChangeAspect="1"/>
-          </p:cNvPicPr>
-          <p:nvPr/>
-        </p:nvPicPr>
-        <p:blipFill>
-          <a:blip r:embed="rId3"/>
-          <a:stretch>
-            <a:fillRect/>
-          </a:stretch>
-        </p:blipFill>
-        <p:spPr>
-          <a:xfrm>
-            <a:off x="3035300" y="825500"/>
-            <a:ext cx="2806700" cy="2120900"/>
-          </a:xfrm>
-          <a:prstGeom prst="rect">
-            <a:avLst/>
-          </a:prstGeom>
-        </p:spPr>
-      </p:pic>
-      <p:pic>
-        <p:nvPicPr>
-          <p:cNvPr id="31" name="Picture 30" descr="image.png"/>
-          <p:cNvPicPr>
-            <a:picLocks noChangeAspect="1"/>
-          </p:cNvPicPr>
-          <p:nvPr/>
-        </p:nvPicPr>
-        <p:blipFill>
-          <a:blip r:embed="rId4"/>
-          <a:stretch>
-            <a:fillRect/>
-          </a:stretch>
-        </p:blipFill>
-        <p:spPr>
-          <a:xfrm>
-            <a:off x="6057900" y="825500"/>
-            <a:ext cx="2806700" cy="2120900"/>
-          </a:xfrm>
-          <a:prstGeom prst="rect">
-            <a:avLst/>
-          </a:prstGeom>
-        </p:spPr>
-      </p:pic>
-      <p:pic>
-        <p:nvPicPr>
-          <p:cNvPr id="32" name="Picture 31" descr="image.png"/>
-          <p:cNvPicPr>
-            <a:picLocks noChangeAspect="1"/>
-          </p:cNvPicPr>
-          <p:nvPr/>
-        </p:nvPicPr>
-        <p:blipFill>
-          <a:blip r:embed="rId5"/>
-          <a:stretch>
-            <a:fillRect/>
-          </a:stretch>
-        </p:blipFill>
-        <p:spPr>
-          <a:xfrm>
-            <a:off x="12700" y="2984500"/>
-            <a:ext cx="2806700" cy="2120900"/>
-          </a:xfrm>
-          <a:prstGeom prst="rect">
-            <a:avLst/>
-          </a:prstGeom>
-        </p:spPr>
-      </p:pic>
-      <p:pic>
-        <p:nvPicPr>
-          <p:cNvPr id="33" name="Picture 32" descr="image.png"/>
-          <p:cNvPicPr>
-            <a:picLocks noChangeAspect="1"/>
-          </p:cNvPicPr>
-          <p:nvPr/>
-        </p:nvPicPr>
-        <p:blipFill>
-          <a:blip r:embed="rId6"/>
-          <a:stretch>
-            <a:fillRect/>
-          </a:stretch>
-        </p:blipFill>
-        <p:spPr>
-          <a:xfrm>
-            <a:off x="3035300" y="2984500"/>
-            <a:ext cx="2806700" cy="2120900"/>
-          </a:xfrm>
-          <a:prstGeom prst="rect">
-            <a:avLst/>
-          </a:prstGeom>
-        </p:spPr>
-      </p:pic>
-      <p:pic>
-        <p:nvPicPr>
-          <p:cNvPr id="34" name="Picture 33" descr="image.png"/>
-          <p:cNvPicPr>
-            <a:picLocks noChangeAspect="1"/>
-          </p:cNvPicPr>
-          <p:nvPr/>
-        </p:nvPicPr>
-        <p:blipFill>
-          <a:blip r:embed="rId7"/>
-          <a:stretch>
-            <a:fillRect/>
-          </a:stretch>
-        </p:blipFill>
-        <p:spPr>
-          <a:xfrm>
-            <a:off x="6057900" y="2984500"/>
-            <a:ext cx="2806700" cy="2120900"/>
-          </a:xfrm>
-          <a:prstGeom prst="rect">
-            <a:avLst/>
-          </a:prstGeom>
-        </p:spPr>
-      </p:pic>
-      <p:pic>
-        <p:nvPicPr>
-          <p:cNvPr id="35" name="Picture 34" descr="image.png"/>
-          <p:cNvPicPr>
-            <a:picLocks noChangeAspect="1"/>
-          </p:cNvPicPr>
-          <p:nvPr/>
-        </p:nvPicPr>
-        <p:blipFill>
-          <a:blip r:embed="rId2"/>
-          <a:stretch>
-            <a:fillRect/>
-          </a:stretch>
-        </p:blipFill>
-        <p:spPr>
-          <a:xfrm>
-            <a:off x="12700" y="825500"/>
-            <a:ext cx="2806700" cy="2120900"/>
-          </a:xfrm>
-          <a:prstGeom prst="rect">
-            <a:avLst/>
-          </a:prstGeom>
-        </p:spPr>
-      </p:pic>
-      <p:pic>
-        <p:nvPicPr>
-          <p:cNvPr id="36" name="Picture 35" descr="image.png"/>
-          <p:cNvPicPr>
-            <a:picLocks noChangeAspect="1"/>
-          </p:cNvPicPr>
-          <p:nvPr/>
-        </p:nvPicPr>
-        <p:blipFill>
-          <a:blip r:embed="rId3"/>
-          <a:stretch>
-            <a:fillRect/>
-          </a:stretch>
-        </p:blipFill>
-        <p:spPr>
-          <a:xfrm>
-            <a:off x="3035300" y="825500"/>
-            <a:ext cx="2806700" cy="2120900"/>
-          </a:xfrm>
-          <a:prstGeom prst="rect">
-            <a:avLst/>
-          </a:prstGeom>
-        </p:spPr>
-      </p:pic>
-      <p:pic>
-        <p:nvPicPr>
-          <p:cNvPr id="37" name="Picture 36" descr="image.png"/>
-          <p:cNvPicPr>
-            <a:picLocks noChangeAspect="1"/>
-          </p:cNvPicPr>
-          <p:nvPr/>
-        </p:nvPicPr>
-        <p:blipFill>
-          <a:blip r:embed="rId4"/>
-          <a:stretch>
-            <a:fillRect/>
-          </a:stretch>
-        </p:blipFill>
-        <p:spPr>
-          <a:xfrm>
-            <a:off x="6057900" y="825500"/>
-            <a:ext cx="2806700" cy="2120900"/>
-          </a:xfrm>
-          <a:prstGeom prst="rect">
-            <a:avLst/>
-          </a:prstGeom>
-        </p:spPr>
-      </p:pic>
-      <p:pic>
-        <p:nvPicPr>
-          <p:cNvPr id="38" name="Picture 37" descr="image.png"/>
-          <p:cNvPicPr>
-            <a:picLocks noChangeAspect="1"/>
-          </p:cNvPicPr>
-          <p:nvPr/>
-        </p:nvPicPr>
-        <p:blipFill>
-          <a:blip r:embed="rId5"/>
-          <a:stretch>
-            <a:fillRect/>
-          </a:stretch>
-        </p:blipFill>
-        <p:spPr>
-          <a:xfrm>
-            <a:off x="12700" y="2984500"/>
-            <a:ext cx="2806700" cy="2120900"/>
-          </a:xfrm>
-          <a:prstGeom prst="rect">
-            <a:avLst/>
-          </a:prstGeom>
-        </p:spPr>
-      </p:pic>
-      <p:pic>
-        <p:nvPicPr>
-          <p:cNvPr id="39" name="Picture 38" descr="image.png"/>
-          <p:cNvPicPr>
-            <a:picLocks noChangeAspect="1"/>
-          </p:cNvPicPr>
-          <p:nvPr/>
-        </p:nvPicPr>
-        <p:blipFill>
-          <a:blip r:embed="rId6"/>
-          <a:stretch>
-            <a:fillRect/>
-          </a:stretch>
-        </p:blipFill>
-        <p:spPr>
-          <a:xfrm>
-            <a:off x="3035300" y="2984500"/>
-            <a:ext cx="2806700" cy="2120900"/>
-          </a:xfrm>
-          <a:prstGeom prst="rect">
-            <a:avLst/>
-          </a:prstGeom>
-        </p:spPr>
-      </p:pic>
-      <p:pic>
-        <p:nvPicPr>
-          <p:cNvPr id="40" name="Picture 39" descr="image.png"/>
-          <p:cNvPicPr>
-            <a:picLocks noChangeAspect="1"/>
-          </p:cNvPicPr>
-          <p:nvPr/>
-        </p:nvPicPr>
-        <p:blipFill>
-          <a:blip r:embed="rId7"/>
-          <a:stretch>
-            <a:fillRect/>
-          </a:stretch>
-        </p:blipFill>
-        <p:spPr>
-          <a:xfrm>
-            <a:off x="6057900" y="2984500"/>
-            <a:ext cx="2806700" cy="2120900"/>
-          </a:xfrm>
-          <a:prstGeom prst="rect">
-            <a:avLst/>
-          </a:prstGeom>
-        </p:spPr>
-      </p:pic>
-      <p:pic>
-        <p:nvPicPr>
-          <p:cNvPr id="41" name="Picture 40" descr="image.png"/>
-          <p:cNvPicPr>
-            <a:picLocks noChangeAspect="1"/>
-          </p:cNvPicPr>
-          <p:nvPr/>
-        </p:nvPicPr>
-        <p:blipFill>
-          <a:blip r:embed="rId2"/>
-          <a:stretch>
-            <a:fillRect/>
-          </a:stretch>
-        </p:blipFill>
-        <p:spPr>
-          <a:xfrm>
-            <a:off x="12700" y="825500"/>
-            <a:ext cx="2806700" cy="2120900"/>
-          </a:xfrm>
-          <a:prstGeom prst="rect">
-            <a:avLst/>
-          </a:prstGeom>
-        </p:spPr>
-      </p:pic>
-      <p:pic>
-        <p:nvPicPr>
-          <p:cNvPr id="42" name="Picture 41" descr="image.png"/>
-          <p:cNvPicPr>
-            <a:picLocks noChangeAspect="1"/>
-          </p:cNvPicPr>
-          <p:nvPr/>
-        </p:nvPicPr>
-        <p:blipFill>
-          <a:blip r:embed="rId3"/>
-          <a:stretch>
-            <a:fillRect/>
-          </a:stretch>
-        </p:blipFill>
-        <p:spPr>
-          <a:xfrm>
-            <a:off x="3035300" y="825500"/>
-            <a:ext cx="2806700" cy="2120900"/>
-          </a:xfrm>
-          <a:prstGeom prst="rect">
-            <a:avLst/>
-          </a:prstGeom>
-        </p:spPr>
-      </p:pic>
-      <p:pic>
-        <p:nvPicPr>
-          <p:cNvPr id="43" name="Picture 42" descr="image.png"/>
-          <p:cNvPicPr>
-            <a:picLocks noChangeAspect="1"/>
-          </p:cNvPicPr>
-          <p:nvPr/>
-        </p:nvPicPr>
-        <p:blipFill>
-          <a:blip r:embed="rId4"/>
-          <a:stretch>
-            <a:fillRect/>
-          </a:stretch>
-        </p:blipFill>
-        <p:spPr>
-          <a:xfrm>
-            <a:off x="6057900" y="825500"/>
-            <a:ext cx="2806700" cy="2120900"/>
-          </a:xfrm>
-          <a:prstGeom prst="rect">
-            <a:avLst/>
-          </a:prstGeom>
-        </p:spPr>
-      </p:pic>
-      <p:pic>
-        <p:nvPicPr>
-          <p:cNvPr id="44" name="Picture 43" descr="image.png"/>
-          <p:cNvPicPr>
-            <a:picLocks noChangeAspect="1"/>
-          </p:cNvPicPr>
-          <p:nvPr/>
-        </p:nvPicPr>
-        <p:blipFill>
-          <a:blip r:embed="rId5"/>
-          <a:stretch>
-            <a:fillRect/>
-          </a:stretch>
-        </p:blipFill>
-        <p:spPr>
-          <a:xfrm>
-            <a:off x="12700" y="2984500"/>
-            <a:ext cx="2806700" cy="2120900"/>
-          </a:xfrm>
-          <a:prstGeom prst="rect">
-            <a:avLst/>
-          </a:prstGeom>
-        </p:spPr>
-      </p:pic>
-      <p:pic>
-        <p:nvPicPr>
-          <p:cNvPr id="45" name="Picture 44" descr="image.png"/>
-          <p:cNvPicPr>
-            <a:picLocks noChangeAspect="1"/>
-          </p:cNvPicPr>
-          <p:nvPr/>
-        </p:nvPicPr>
-        <p:blipFill>
-          <a:blip r:embed="rId6"/>
-          <a:stretch>
-            <a:fillRect/>
-          </a:stretch>
-        </p:blipFill>
-        <p:spPr>
-          <a:xfrm>
-            <a:off x="3035300" y="2984500"/>
-            <a:ext cx="2806700" cy="2120900"/>
-          </a:xfrm>
-          <a:prstGeom prst="rect">
-            <a:avLst/>
-          </a:prstGeom>
-        </p:spPr>
-      </p:pic>
-      <p:pic>
-        <p:nvPicPr>
-          <p:cNvPr id="46" name="Picture 45" descr="image.png"/>
-          <p:cNvPicPr>
-            <a:picLocks noChangeAspect="1"/>
-          </p:cNvPicPr>
-          <p:nvPr/>
-        </p:nvPicPr>
-        <p:blipFill>
-          <a:blip r:embed="rId7"/>
-          <a:stretch>
-            <a:fillRect/>
-          </a:stretch>
-        </p:blipFill>
-        <p:spPr>
-          <a:xfrm>
-            <a:off x="6057900" y="2984500"/>
-            <a:ext cx="2806700" cy="2120900"/>
-          </a:xfrm>
-          <a:prstGeom prst="rect">
-            <a:avLst/>
-          </a:prstGeom>
-        </p:spPr>
-      </p:pic>
     </p:spTree>
     <p:extLst>
       <p:ext uri="{BB962C8B-B14F-4D97-AF65-F5344CB8AC3E}">

</xml_diff>